<commit_message>
adding the meat of the notebooks, and quick updates to the poster
</commit_message>
<xml_diff>
--- a/AAS_224_ELY.pptx
+++ b/AAS_224_ELY.pptx
@@ -3828,7 +3828,7 @@
         <p:spPr>
           <a:xfrm>
             <a:off x="30435055" y="10175128"/>
-            <a:ext cx="9140358" cy="20133481"/>
+            <a:ext cx="9140358" cy="22717872"/>
           </a:xfrm>
           <a:prstGeom prst="roundRect">
             <a:avLst>
@@ -3881,7 +3881,7 @@
         <p:spPr>
           <a:xfrm>
             <a:off x="20428037" y="10175128"/>
-            <a:ext cx="9140358" cy="20133481"/>
+            <a:ext cx="9140358" cy="22717872"/>
           </a:xfrm>
           <a:prstGeom prst="roundRect">
             <a:avLst>
@@ -3934,7 +3934,7 @@
         <p:spPr>
           <a:xfrm>
             <a:off x="10428797" y="10175128"/>
-            <a:ext cx="9140358" cy="20133481"/>
+            <a:ext cx="9140358" cy="29448872"/>
           </a:xfrm>
           <a:prstGeom prst="roundRect">
             <a:avLst>
@@ -3987,7 +3987,7 @@
         <p:spPr>
           <a:xfrm>
             <a:off x="558799" y="10175122"/>
-            <a:ext cx="9140358" cy="20133481"/>
+            <a:ext cx="9140358" cy="29448878"/>
           </a:xfrm>
           <a:prstGeom prst="roundRect">
             <a:avLst>
@@ -4055,21 +4055,18 @@
           <a:p>
             <a:pPr algn="ctr"/>
             <a:r>
-              <a:rPr lang="en-US" sz="5400" b="1" i="1" dirty="0" smtClean="0">
-                <a:solidFill>
-                  <a:srgbClr val="FFFFFF"/>
-                </a:solidFill>
-              </a:rPr>
-              <a:t>Gain </a:t>
-            </a:r>
-            <a:r>
-              <a:rPr lang="en-US" sz="5400" b="1" i="1" dirty="0" smtClean="0">
-                <a:solidFill>
-                  <a:srgbClr val="FFFFFF"/>
-                </a:solidFill>
-              </a:rPr>
-              <a:t>Sag</a:t>
-            </a:r>
+              <a:rPr lang="en-US" sz="5400" b="1" i="1" dirty="0" err="1" smtClean="0">
+                <a:solidFill>
+                  <a:srgbClr val="FFFFFF"/>
+                </a:solidFill>
+              </a:rPr>
+              <a:t>TimeFilter</a:t>
+            </a:r>
+            <a:endParaRPr lang="en-US" sz="5400" b="1" i="1" dirty="0" smtClean="0">
+              <a:solidFill>
+                <a:srgbClr val="FFFFFF"/>
+              </a:solidFill>
+            </a:endParaRPr>
           </a:p>
           <a:p>
             <a:pPr algn="just"/>
@@ -4166,6 +4163,269 @@
           <a:xfrm>
             <a:off x="35435213" y="35466891"/>
             <a:ext cx="3810000" cy="3810000"/>
+          </a:xfrm>
+          <a:prstGeom prst="rect">
+            <a:avLst/>
+          </a:prstGeom>
+        </p:spPr>
+      </p:pic>
+      <p:pic>
+        <p:nvPicPr>
+          <p:cNvPr id="14" name="Picture 13" descr="spectrum_before.pdf"/>
+          <p:cNvPicPr>
+            <a:picLocks noChangeAspect="1"/>
+          </p:cNvPicPr>
+          <p:nvPr/>
+        </p:nvPicPr>
+        <p:blipFill>
+          <a:blip r:embed="rId6">
+            <a:extLst>
+              <a:ext uri="{28A0092B-C50C-407E-A947-70E740481C1C}">
+                <a14:useLocalDpi xmlns:a14="http://schemas.microsoft.com/office/drawing/2010/main" val="0"/>
+              </a:ext>
+            </a:extLst>
+          </a:blip>
+          <a:stretch>
+            <a:fillRect/>
+          </a:stretch>
+        </p:blipFill>
+        <p:spPr>
+          <a:xfrm>
+            <a:off x="10674755" y="13432075"/>
+            <a:ext cx="8686800" cy="4368701"/>
+          </a:xfrm>
+          <a:prstGeom prst="rect">
+            <a:avLst/>
+          </a:prstGeom>
+        </p:spPr>
+      </p:pic>
+      <p:pic>
+        <p:nvPicPr>
+          <p:cNvPr id="15" name="Picture 14" descr="spectrum_after.pdf"/>
+          <p:cNvPicPr>
+            <a:picLocks noChangeAspect="1"/>
+          </p:cNvPicPr>
+          <p:nvPr/>
+        </p:nvPicPr>
+        <p:blipFill>
+          <a:blip r:embed="rId7">
+            <a:extLst>
+              <a:ext uri="{28A0092B-C50C-407E-A947-70E740481C1C}">
+                <a14:useLocalDpi xmlns:a14="http://schemas.microsoft.com/office/drawing/2010/main" val="0"/>
+              </a:ext>
+            </a:extLst>
+          </a:blip>
+          <a:stretch>
+            <a:fillRect/>
+          </a:stretch>
+        </p:blipFill>
+        <p:spPr>
+          <a:xfrm>
+            <a:off x="10669970" y="32893000"/>
+            <a:ext cx="8686800" cy="4368701"/>
+          </a:xfrm>
+          <a:prstGeom prst="rect">
+            <a:avLst/>
+          </a:prstGeom>
+        </p:spPr>
+      </p:pic>
+      <p:sp>
+        <p:nvSpPr>
+          <p:cNvPr id="114" name="TextBox 113"/>
+          <p:cNvSpPr txBox="1"/>
+          <p:nvPr/>
+        </p:nvSpPr>
+        <p:spPr>
+          <a:xfrm>
+            <a:off x="20589443" y="33747257"/>
+            <a:ext cx="14662763" cy="5847754"/>
+          </a:xfrm>
+          <a:prstGeom prst="rect">
+            <a:avLst/>
+          </a:prstGeom>
+          <a:noFill/>
+        </p:spPr>
+        <p:txBody>
+          <a:bodyPr wrap="square" rtlCol="0">
+            <a:spAutoFit/>
+          </a:bodyPr>
+          <a:lstStyle/>
+          <a:p>
+            <a:pPr algn="ctr"/>
+            <a:r>
+              <a:rPr lang="en-US" sz="5400" b="1" i="1" dirty="0" smtClean="0">
+                <a:solidFill>
+                  <a:srgbClr val="FFFFFF"/>
+                </a:solidFill>
+              </a:rPr>
+              <a:t>Tutorials</a:t>
+            </a:r>
+          </a:p>
+          <a:p>
+            <a:pPr algn="just"/>
+            <a:r>
+              <a:rPr lang="en-US" sz="3200" b="1" i="1" dirty="0" smtClean="0">
+                <a:solidFill>
+                  <a:schemeClr val="bg1"/>
+                </a:solidFill>
+              </a:rPr>
+              <a:t>Running the calibration and analysis shown here can be a complicated process, and not very amenable to display in the poster format.  As such, In-depth tutorials for each of the topics explained here can be found at the following location. </a:t>
+            </a:r>
+            <a:r>
+              <a:rPr lang="en-US" sz="3200" b="1" i="1" dirty="0" smtClean="0">
+                <a:solidFill>
+                  <a:schemeClr val="bg1"/>
+                </a:solidFill>
+                <a:hlinkClick r:id="rId8"/>
+              </a:rPr>
+              <a:t>https://github.com/justincely/AAS224</a:t>
+            </a:r>
+            <a:r>
+              <a:rPr lang="en-US" sz="3200" b="1" i="1" dirty="0" smtClean="0">
+                <a:solidFill>
+                  <a:schemeClr val="bg1"/>
+                </a:solidFill>
+              </a:rPr>
+              <a:t> </a:t>
+            </a:r>
+          </a:p>
+          <a:p>
+            <a:pPr algn="just"/>
+            <a:endParaRPr lang="en-US" sz="3200" b="1" i="1" dirty="0">
+              <a:solidFill>
+                <a:schemeClr val="bg1"/>
+              </a:solidFill>
+            </a:endParaRPr>
+          </a:p>
+          <a:p>
+            <a:pPr algn="just"/>
+            <a:r>
+              <a:rPr lang="en-US" sz="3200" b="1" i="1" dirty="0" smtClean="0">
+                <a:solidFill>
+                  <a:schemeClr val="bg1"/>
+                </a:solidFill>
+              </a:rPr>
+              <a:t>This link connects to a </a:t>
+            </a:r>
+            <a:r>
+              <a:rPr lang="en-US" sz="3200" b="1" i="1" dirty="0" err="1" smtClean="0">
+                <a:solidFill>
+                  <a:schemeClr val="bg1"/>
+                </a:solidFill>
+              </a:rPr>
+              <a:t>GitHub</a:t>
+            </a:r>
+            <a:r>
+              <a:rPr lang="en-US" sz="3200" b="1" i="1" dirty="0" smtClean="0">
+                <a:solidFill>
+                  <a:schemeClr val="bg1"/>
+                </a:solidFill>
+              </a:rPr>
+              <a:t> repository containing step-by-step demonstrations  using the mentioned tools and techniques.  Each tutorial is written in Python and  contained in an </a:t>
+            </a:r>
+            <a:r>
+              <a:rPr lang="en-US" sz="3200" b="1" i="1" dirty="0" err="1" smtClean="0">
+                <a:solidFill>
+                  <a:schemeClr val="bg1"/>
+                </a:solidFill>
+              </a:rPr>
+              <a:t>iPython</a:t>
+            </a:r>
+            <a:r>
+              <a:rPr lang="en-US" sz="3200" b="1" i="1" dirty="0" smtClean="0">
+                <a:solidFill>
+                  <a:schemeClr val="bg1"/>
+                </a:solidFill>
+              </a:rPr>
+              <a:t> notebook such that they can be re-run and modified at will.  PDF and HTML versions of the tutorials, this poster, all plots, and the raw datasets are also included.</a:t>
+            </a:r>
+            <a:endParaRPr lang="en-US" sz="3200" b="1" i="1" dirty="0" smtClean="0">
+              <a:solidFill>
+                <a:schemeClr val="bg1"/>
+              </a:solidFill>
+            </a:endParaRPr>
+          </a:p>
+        </p:txBody>
+      </p:sp>
+      <p:sp>
+        <p:nvSpPr>
+          <p:cNvPr id="115" name="TextBox 114"/>
+          <p:cNvSpPr txBox="1"/>
+          <p:nvPr/>
+        </p:nvSpPr>
+        <p:spPr>
+          <a:xfrm>
+            <a:off x="883570" y="10927536"/>
+            <a:ext cx="8119837" cy="1415772"/>
+          </a:xfrm>
+          <a:prstGeom prst="rect">
+            <a:avLst/>
+          </a:prstGeom>
+          <a:noFill/>
+        </p:spPr>
+        <p:txBody>
+          <a:bodyPr wrap="square" rtlCol="0">
+            <a:spAutoFit/>
+          </a:bodyPr>
+          <a:lstStyle/>
+          <a:p>
+            <a:pPr algn="ctr"/>
+            <a:r>
+              <a:rPr lang="en-US" sz="5400" b="1" i="1" dirty="0" err="1" smtClean="0">
+                <a:solidFill>
+                  <a:srgbClr val="FFFFFF"/>
+                </a:solidFill>
+              </a:rPr>
+              <a:t>Lightcurves</a:t>
+            </a:r>
+            <a:endParaRPr lang="en-US" sz="5400" b="1" i="1" dirty="0" smtClean="0">
+              <a:solidFill>
+                <a:srgbClr val="FFFFFF"/>
+              </a:solidFill>
+            </a:endParaRPr>
+          </a:p>
+          <a:p>
+            <a:pPr algn="just"/>
+            <a:r>
+              <a:rPr lang="en-US" sz="3200" b="1" i="1" dirty="0" smtClean="0">
+                <a:solidFill>
+                  <a:schemeClr val="bg1"/>
+                </a:solidFill>
+              </a:rPr>
+              <a:t>The text will go here.</a:t>
+            </a:r>
+            <a:endParaRPr lang="en-US" sz="3200" b="1" i="1" dirty="0" smtClean="0">
+              <a:solidFill>
+                <a:schemeClr val="bg1"/>
+              </a:solidFill>
+            </a:endParaRPr>
+          </a:p>
+        </p:txBody>
+      </p:sp>
+      <p:pic>
+        <p:nvPicPr>
+          <p:cNvPr id="16" name="Picture 15" descr="spectrum_vs_lightcurve.pdf"/>
+          <p:cNvPicPr>
+            <a:picLocks noChangeAspect="1"/>
+          </p:cNvPicPr>
+          <p:nvPr/>
+        </p:nvPicPr>
+        <p:blipFill>
+          <a:blip r:embed="rId9">
+            <a:extLst>
+              <a:ext uri="{28A0092B-C50C-407E-A947-70E740481C1C}">
+                <a14:useLocalDpi xmlns:a14="http://schemas.microsoft.com/office/drawing/2010/main" val="0"/>
+              </a:ext>
+            </a:extLst>
+          </a:blip>
+          <a:stretch>
+            <a:fillRect/>
+          </a:stretch>
+        </p:blipFill>
+        <p:spPr>
+          <a:xfrm>
+            <a:off x="768121" y="24261975"/>
+            <a:ext cx="8686800" cy="4575997"/>
           </a:xfrm>
           <a:prstGeom prst="rect">
             <a:avLst/>

</xml_diff>

<commit_message>
added corrtag section to poster
</commit_message>
<xml_diff>
--- a/AAS_224_ELY.pptx
+++ b/AAS_224_ELY.pptx
@@ -3933,8 +3933,8 @@
         </p:nvSpPr>
         <p:spPr>
           <a:xfrm>
-            <a:off x="10428797" y="10175128"/>
-            <a:ext cx="9140358" cy="29448872"/>
+            <a:off x="10465352" y="16789400"/>
+            <a:ext cx="9140358" cy="22790222"/>
           </a:xfrm>
           <a:prstGeom prst="roundRect">
             <a:avLst>
@@ -3986,8 +3986,8 @@
         </p:nvSpPr>
         <p:spPr>
           <a:xfrm>
-            <a:off x="558799" y="10175122"/>
-            <a:ext cx="9140358" cy="29448878"/>
+            <a:off x="555155" y="16789400"/>
+            <a:ext cx="9140358" cy="22834600"/>
           </a:xfrm>
           <a:prstGeom prst="roundRect">
             <a:avLst>
@@ -4039,8 +4039,8 @@
         </p:nvSpPr>
         <p:spPr>
           <a:xfrm>
-            <a:off x="11006035" y="10775136"/>
-            <a:ext cx="8119837" cy="1415772"/>
+            <a:off x="10428797" y="16819348"/>
+            <a:ext cx="9140358" cy="1415772"/>
           </a:xfrm>
           <a:prstGeom prst="rect">
             <a:avLst/>
@@ -4069,18 +4069,10 @@
             </a:endParaRPr>
           </a:p>
           <a:p>
-            <a:pPr algn="just"/>
-            <a:r>
-              <a:rPr lang="en-US" sz="3200" b="1" i="1" dirty="0" smtClean="0">
-                <a:solidFill>
-                  <a:schemeClr val="bg1"/>
-                </a:solidFill>
-              </a:rPr>
-              <a:t>The text will go here.</a:t>
-            </a:r>
+            <a:pPr algn="ctr"/>
             <a:endParaRPr lang="en-US" sz="3200" b="1" i="1" dirty="0" smtClean="0">
               <a:solidFill>
-                <a:schemeClr val="bg1"/>
+                <a:srgbClr val="FFFFFF"/>
               </a:solidFill>
             </a:endParaRPr>
           </a:p>
@@ -4161,7 +4153,7 @@
         </p:blipFill>
         <p:spPr>
           <a:xfrm>
-            <a:off x="35435213" y="35466891"/>
+            <a:off x="35435213" y="34958891"/>
             <a:ext cx="3810000" cy="3810000"/>
           </a:xfrm>
           <a:prstGeom prst="rect">
@@ -4191,7 +4183,7 @@
         </p:blipFill>
         <p:spPr>
           <a:xfrm>
-            <a:off x="10674755" y="13432075"/>
+            <a:off x="10669970" y="21737875"/>
             <a:ext cx="8686800" cy="4368701"/>
           </a:xfrm>
           <a:prstGeom prst="rect">
@@ -4355,8 +4347,8 @@
         </p:nvSpPr>
         <p:spPr>
           <a:xfrm>
-            <a:off x="883570" y="10927536"/>
-            <a:ext cx="8119837" cy="1415772"/>
+            <a:off x="555155" y="16831862"/>
+            <a:ext cx="9140357" cy="4370427"/>
           </a:xfrm>
           <a:prstGeom prst="rect">
             <a:avLst/>
@@ -4392,7 +4384,58 @@
                   <a:schemeClr val="bg1"/>
                 </a:solidFill>
               </a:rPr>
-              <a:t>The text will go here.</a:t>
+              <a:t>The standard </a:t>
+            </a:r>
+            <a:r>
+              <a:rPr lang="en-US" sz="3200" b="1" i="1" dirty="0" err="1" smtClean="0">
+                <a:solidFill>
+                  <a:schemeClr val="bg1"/>
+                </a:solidFill>
+              </a:rPr>
+              <a:t>CalCOS</a:t>
+            </a:r>
+            <a:r>
+              <a:rPr lang="en-US" sz="3200" b="1" i="1" dirty="0" smtClean="0">
+                <a:solidFill>
+                  <a:schemeClr val="bg1"/>
+                </a:solidFill>
+              </a:rPr>
+              <a:t> pipeline extracts 1D dispersed spectra as the final data products.  The time information collected during data gathering, and used in subsequent processing, can instead be used to extract time-series </a:t>
+            </a:r>
+            <a:r>
+              <a:rPr lang="en-US" sz="3200" b="1" i="1" dirty="0" err="1" smtClean="0">
+                <a:solidFill>
+                  <a:schemeClr val="bg1"/>
+                </a:solidFill>
+              </a:rPr>
+              <a:t>lightcurves</a:t>
+            </a:r>
+            <a:r>
+              <a:rPr lang="en-US" sz="3200" b="1" i="1" dirty="0" smtClean="0">
+                <a:solidFill>
+                  <a:schemeClr val="bg1"/>
+                </a:solidFill>
+              </a:rPr>
+              <a:t>.  </a:t>
+            </a:r>
+          </a:p>
+          <a:p>
+            <a:pPr algn="just"/>
+            <a:endParaRPr lang="en-US" sz="3200" b="1" i="1" dirty="0">
+              <a:solidFill>
+                <a:schemeClr val="bg1"/>
+              </a:solidFill>
+            </a:endParaRPr>
+          </a:p>
+          <a:p>
+            <a:pPr algn="just"/>
+            <a:r>
+              <a:rPr lang="en-US" sz="3200" b="1" i="1" dirty="0" smtClean="0">
+                <a:solidFill>
+                  <a:schemeClr val="bg1"/>
+                </a:solidFill>
+              </a:rPr>
+              <a:t>The </a:t>
             </a:r>
             <a:endParaRPr lang="en-US" sz="3200" b="1" i="1" dirty="0" smtClean="0">
               <a:solidFill>
@@ -4432,6 +4475,504 @@
           </a:prstGeom>
         </p:spPr>
       </p:pic>
+      <p:pic>
+        <p:nvPicPr>
+          <p:cNvPr id="18" name="Picture 17" descr="lightcurve_webpage.png"/>
+          <p:cNvPicPr>
+            <a:picLocks noChangeAspect="1"/>
+          </p:cNvPicPr>
+          <p:nvPr/>
+        </p:nvPicPr>
+        <p:blipFill>
+          <a:blip r:embed="rId10">
+            <a:extLst>
+              <a:ext uri="{28A0092B-C50C-407E-A947-70E740481C1C}">
+                <a14:useLocalDpi xmlns:a14="http://schemas.microsoft.com/office/drawing/2010/main" val="0"/>
+              </a:ext>
+            </a:extLst>
+          </a:blip>
+          <a:stretch>
+            <a:fillRect/>
+          </a:stretch>
+        </p:blipFill>
+        <p:spPr>
+          <a:xfrm>
+            <a:off x="7285799" y="36739568"/>
+            <a:ext cx="2092156" cy="2092156"/>
+          </a:xfrm>
+          <a:prstGeom prst="rect">
+            <a:avLst/>
+          </a:prstGeom>
+        </p:spPr>
+      </p:pic>
+      <p:sp>
+        <p:nvSpPr>
+          <p:cNvPr id="116" name="TextBox 115"/>
+          <p:cNvSpPr txBox="1"/>
+          <p:nvPr/>
+        </p:nvSpPr>
+        <p:spPr>
+          <a:xfrm>
+            <a:off x="768121" y="36215623"/>
+            <a:ext cx="6381979" cy="2616101"/>
+          </a:xfrm>
+          <a:prstGeom prst="rect">
+            <a:avLst/>
+          </a:prstGeom>
+          <a:noFill/>
+        </p:spPr>
+        <p:txBody>
+          <a:bodyPr wrap="square" rtlCol="0">
+            <a:spAutoFit/>
+          </a:bodyPr>
+          <a:lstStyle/>
+          <a:p>
+            <a:pPr algn="ctr"/>
+            <a:r>
+              <a:rPr lang="en-US" sz="4400" b="1" i="1" dirty="0" smtClean="0">
+                <a:solidFill>
+                  <a:srgbClr val="FFFFFF"/>
+                </a:solidFill>
+              </a:rPr>
+              <a:t>Code Repository</a:t>
+            </a:r>
+            <a:endParaRPr lang="en-US" sz="4400" b="1" i="1" dirty="0" smtClean="0">
+              <a:solidFill>
+                <a:srgbClr val="FFFFFF"/>
+              </a:solidFill>
+            </a:endParaRPr>
+          </a:p>
+          <a:p>
+            <a:pPr algn="just"/>
+            <a:r>
+              <a:rPr lang="en-US" sz="2400" b="1" i="1" dirty="0" smtClean="0">
+                <a:solidFill>
+                  <a:schemeClr val="bg1"/>
+                </a:solidFill>
+              </a:rPr>
+              <a:t>The library used to extract the </a:t>
+            </a:r>
+            <a:r>
+              <a:rPr lang="en-US" sz="2400" b="1" i="1" dirty="0" err="1" smtClean="0">
+                <a:solidFill>
+                  <a:schemeClr val="bg1"/>
+                </a:solidFill>
+              </a:rPr>
+              <a:t>lightcurves</a:t>
+            </a:r>
+            <a:r>
+              <a:rPr lang="en-US" sz="2400" b="1" i="1" dirty="0" smtClean="0">
+                <a:solidFill>
+                  <a:schemeClr val="bg1"/>
+                </a:solidFill>
+              </a:rPr>
+              <a:t> on this poster is available on both </a:t>
+            </a:r>
+            <a:r>
+              <a:rPr lang="en-US" sz="2400" b="1" i="1" dirty="0" err="1" smtClean="0">
+                <a:solidFill>
+                  <a:schemeClr val="bg1"/>
+                </a:solidFill>
+              </a:rPr>
+              <a:t>GitHub</a:t>
+            </a:r>
+            <a:r>
+              <a:rPr lang="en-US" sz="2400" b="1" i="1" dirty="0" smtClean="0">
+                <a:solidFill>
+                  <a:schemeClr val="bg1"/>
+                </a:solidFill>
+              </a:rPr>
+              <a:t> and the Python Package Index.  You can find more information, download the source, or contribute to the library at the following:</a:t>
+            </a:r>
+          </a:p>
+        </p:txBody>
+      </p:sp>
+      <p:sp>
+        <p:nvSpPr>
+          <p:cNvPr id="117" name="TextBox 116"/>
+          <p:cNvSpPr txBox="1"/>
+          <p:nvPr/>
+        </p:nvSpPr>
+        <p:spPr>
+          <a:xfrm>
+            <a:off x="903820" y="38933291"/>
+            <a:ext cx="8227480" cy="646331"/>
+          </a:xfrm>
+          <a:prstGeom prst="rect">
+            <a:avLst/>
+          </a:prstGeom>
+          <a:noFill/>
+        </p:spPr>
+        <p:txBody>
+          <a:bodyPr wrap="square" rtlCol="0">
+            <a:spAutoFit/>
+          </a:bodyPr>
+          <a:lstStyle/>
+          <a:p>
+            <a:pPr algn="ctr"/>
+            <a:r>
+              <a:rPr lang="en-US" sz="3600" b="1" i="1" dirty="0" smtClean="0">
+                <a:solidFill>
+                  <a:srgbClr val="FFFFFF"/>
+                </a:solidFill>
+                <a:hlinkClick r:id="rId11"/>
+              </a:rPr>
+              <a:t>http://justincely.github.io/lightcurve/</a:t>
+            </a:r>
+            <a:endParaRPr lang="en-US" sz="3600" b="1" i="1" dirty="0" smtClean="0">
+              <a:solidFill>
+                <a:srgbClr val="FFFFFF"/>
+              </a:solidFill>
+            </a:endParaRPr>
+          </a:p>
+        </p:txBody>
+      </p:sp>
+      <p:sp>
+        <p:nvSpPr>
+          <p:cNvPr id="118" name="TextBox 117"/>
+          <p:cNvSpPr txBox="1"/>
+          <p:nvPr/>
+        </p:nvSpPr>
+        <p:spPr>
+          <a:xfrm>
+            <a:off x="21013635" y="10775136"/>
+            <a:ext cx="8119837" cy="1415772"/>
+          </a:xfrm>
+          <a:prstGeom prst="rect">
+            <a:avLst/>
+          </a:prstGeom>
+          <a:noFill/>
+        </p:spPr>
+        <p:txBody>
+          <a:bodyPr wrap="square" rtlCol="0">
+            <a:spAutoFit/>
+          </a:bodyPr>
+          <a:lstStyle/>
+          <a:p>
+            <a:pPr algn="ctr"/>
+            <a:r>
+              <a:rPr lang="en-US" sz="5400" b="1" i="1" dirty="0" err="1" smtClean="0">
+                <a:solidFill>
+                  <a:srgbClr val="FFFFFF"/>
+                </a:solidFill>
+              </a:rPr>
+              <a:t>Splittag</a:t>
+            </a:r>
+            <a:endParaRPr lang="en-US" sz="5400" b="1" i="1" dirty="0" smtClean="0">
+              <a:solidFill>
+                <a:srgbClr val="FFFFFF"/>
+              </a:solidFill>
+            </a:endParaRPr>
+          </a:p>
+          <a:p>
+            <a:pPr algn="just"/>
+            <a:r>
+              <a:rPr lang="en-US" sz="3200" b="1" i="1" dirty="0" smtClean="0">
+                <a:solidFill>
+                  <a:schemeClr val="bg1"/>
+                </a:solidFill>
+              </a:rPr>
+              <a:t>The text will go here.</a:t>
+            </a:r>
+            <a:endParaRPr lang="en-US" sz="3200" b="1" i="1" dirty="0" smtClean="0">
+              <a:solidFill>
+                <a:schemeClr val="bg1"/>
+              </a:solidFill>
+            </a:endParaRPr>
+          </a:p>
+        </p:txBody>
+      </p:sp>
+      <p:pic>
+        <p:nvPicPr>
+          <p:cNvPr id="21" name="Picture 20" descr="eclipse_split.pdf"/>
+          <p:cNvPicPr>
+            <a:picLocks noChangeAspect="1"/>
+          </p:cNvPicPr>
+          <p:nvPr/>
+        </p:nvPicPr>
+        <p:blipFill>
+          <a:blip r:embed="rId12">
+            <a:extLst>
+              <a:ext uri="{28A0092B-C50C-407E-A947-70E740481C1C}">
+                <a14:useLocalDpi xmlns:a14="http://schemas.microsoft.com/office/drawing/2010/main" val="0"/>
+              </a:ext>
+            </a:extLst>
+          </a:blip>
+          <a:stretch>
+            <a:fillRect/>
+          </a:stretch>
+        </p:blipFill>
+        <p:spPr>
+          <a:xfrm>
+            <a:off x="20589443" y="22711797"/>
+            <a:ext cx="8686800" cy="6126175"/>
+          </a:xfrm>
+          <a:prstGeom prst="rect">
+            <a:avLst/>
+          </a:prstGeom>
+        </p:spPr>
+      </p:pic>
+      <p:sp>
+        <p:nvSpPr>
+          <p:cNvPr id="119" name="TextBox 118"/>
+          <p:cNvSpPr txBox="1"/>
+          <p:nvPr/>
+        </p:nvSpPr>
+        <p:spPr>
+          <a:xfrm>
+            <a:off x="30871380" y="10774044"/>
+            <a:ext cx="8119837" cy="1415772"/>
+          </a:xfrm>
+          <a:prstGeom prst="rect">
+            <a:avLst/>
+          </a:prstGeom>
+          <a:noFill/>
+        </p:spPr>
+        <p:txBody>
+          <a:bodyPr wrap="square" rtlCol="0">
+            <a:spAutoFit/>
+          </a:bodyPr>
+          <a:lstStyle/>
+          <a:p>
+            <a:pPr algn="ctr"/>
+            <a:r>
+              <a:rPr lang="en-US" sz="5400" b="1" i="1" dirty="0" smtClean="0">
+                <a:solidFill>
+                  <a:srgbClr val="FFFFFF"/>
+                </a:solidFill>
+              </a:rPr>
+              <a:t>Pulse Height Filtering</a:t>
+            </a:r>
+          </a:p>
+          <a:p>
+            <a:pPr algn="just"/>
+            <a:r>
+              <a:rPr lang="en-US" sz="3200" b="1" i="1" dirty="0" smtClean="0">
+                <a:solidFill>
+                  <a:schemeClr val="bg1"/>
+                </a:solidFill>
+              </a:rPr>
+              <a:t>The text will go here.</a:t>
+            </a:r>
+            <a:endParaRPr lang="en-US" sz="3200" b="1" i="1" dirty="0" smtClean="0">
+              <a:solidFill>
+                <a:schemeClr val="bg1"/>
+              </a:solidFill>
+            </a:endParaRPr>
+          </a:p>
+        </p:txBody>
+      </p:sp>
+      <p:sp>
+        <p:nvSpPr>
+          <p:cNvPr id="120" name="Rounded Rectangle 119"/>
+          <p:cNvSpPr/>
+          <p:nvPr/>
+        </p:nvSpPr>
+        <p:spPr>
+          <a:xfrm>
+            <a:off x="540969" y="10175128"/>
+            <a:ext cx="19147377" cy="5943600"/>
+          </a:xfrm>
+          <a:prstGeom prst="roundRect">
+            <a:avLst>
+              <a:gd name="adj" fmla="val 3938"/>
+            </a:avLst>
+          </a:prstGeom>
+          <a:solidFill>
+            <a:schemeClr val="bg1">
+              <a:lumMod val="65000"/>
+              <a:alpha val="30000"/>
+            </a:schemeClr>
+          </a:solidFill>
+          <a:ln>
+            <a:solidFill>
+              <a:schemeClr val="accent6">
+                <a:lumMod val="75000"/>
+              </a:schemeClr>
+            </a:solidFill>
+          </a:ln>
+        </p:spPr>
+        <p:style>
+          <a:lnRef idx="1">
+            <a:schemeClr val="accent1"/>
+          </a:lnRef>
+          <a:fillRef idx="3">
+            <a:schemeClr val="accent1"/>
+          </a:fillRef>
+          <a:effectRef idx="2">
+            <a:schemeClr val="accent1"/>
+          </a:effectRef>
+          <a:fontRef idx="minor">
+            <a:schemeClr val="lt1"/>
+          </a:fontRef>
+        </p:style>
+        <p:txBody>
+          <a:bodyPr rtlCol="0" anchor="ctr"/>
+          <a:lstStyle/>
+          <a:p>
+            <a:pPr algn="ctr"/>
+            <a:endParaRPr lang="en-US" dirty="0"/>
+          </a:p>
+        </p:txBody>
+      </p:sp>
+      <p:sp>
+        <p:nvSpPr>
+          <p:cNvPr id="121" name="TextBox 120"/>
+          <p:cNvSpPr txBox="1"/>
+          <p:nvPr/>
+        </p:nvSpPr>
+        <p:spPr>
+          <a:xfrm>
+            <a:off x="558799" y="10244617"/>
+            <a:ext cx="19046911" cy="5847754"/>
+          </a:xfrm>
+          <a:prstGeom prst="rect">
+            <a:avLst/>
+          </a:prstGeom>
+          <a:noFill/>
+        </p:spPr>
+        <p:txBody>
+          <a:bodyPr wrap="square" rtlCol="0">
+            <a:spAutoFit/>
+          </a:bodyPr>
+          <a:lstStyle/>
+          <a:p>
+            <a:pPr algn="ctr"/>
+            <a:r>
+              <a:rPr lang="en-US" sz="5400" b="1" i="1" dirty="0" smtClean="0">
+                <a:solidFill>
+                  <a:srgbClr val="FFFFFF"/>
+                </a:solidFill>
+              </a:rPr>
+              <a:t>CORRTAG files</a:t>
+            </a:r>
+          </a:p>
+          <a:p>
+            <a:pPr algn="just"/>
+            <a:r>
+              <a:rPr lang="en-US" sz="3200" b="1" i="1" dirty="0" smtClean="0">
+                <a:solidFill>
+                  <a:schemeClr val="bg1"/>
+                </a:solidFill>
+              </a:rPr>
+              <a:t>There are many data products associated with the </a:t>
+            </a:r>
+            <a:r>
+              <a:rPr lang="en-US" sz="3200" b="1" i="1" dirty="0" err="1" smtClean="0">
+                <a:solidFill>
+                  <a:schemeClr val="bg1"/>
+                </a:solidFill>
+              </a:rPr>
+              <a:t>CalCOS</a:t>
+            </a:r>
+            <a:r>
+              <a:rPr lang="en-US" sz="3200" b="1" i="1" dirty="0" smtClean="0">
+                <a:solidFill>
+                  <a:schemeClr val="bg1"/>
+                </a:solidFill>
+              </a:rPr>
+              <a:t> calibration pipeline, but one file at the heart of COS data is the *_</a:t>
+            </a:r>
+            <a:r>
+              <a:rPr lang="en-US" sz="3200" b="1" i="1" dirty="0" err="1" smtClean="0">
+                <a:solidFill>
+                  <a:schemeClr val="bg1"/>
+                </a:solidFill>
+              </a:rPr>
+              <a:t>corrtag</a:t>
+            </a:r>
+            <a:r>
+              <a:rPr lang="en-US" sz="3200" b="1" i="1" dirty="0" smtClean="0">
+                <a:solidFill>
+                  <a:schemeClr val="bg1"/>
+                </a:solidFill>
+              </a:rPr>
+              <a:t>_* file.  </a:t>
+            </a:r>
+            <a:r>
+              <a:rPr lang="en-US" sz="3200" b="1" i="1" dirty="0" smtClean="0">
+                <a:solidFill>
+                  <a:schemeClr val="bg1"/>
+                </a:solidFill>
+              </a:rPr>
+              <a:t>This file contains a list of every event detected during an observation, along with a large amount of associated formation used in later processing: incident time, detector position, data quality, wavelength, and pulse-height </a:t>
+            </a:r>
+            <a:r>
+              <a:rPr lang="en-US" sz="3200" b="1" i="1" dirty="0" err="1" smtClean="0">
+                <a:solidFill>
+                  <a:schemeClr val="bg1"/>
+                </a:solidFill>
+              </a:rPr>
+              <a:t>amplitutde</a:t>
+            </a:r>
+            <a:r>
+              <a:rPr lang="en-US" sz="3200" b="1" i="1" dirty="0" smtClean="0">
+                <a:solidFill>
+                  <a:schemeClr val="bg1"/>
+                </a:solidFill>
+              </a:rPr>
+              <a:t> (PHA) to name just a few.  Other extensions in the file also include tables of times with good data quality and a second-by-second accounting of various orbital parameters.</a:t>
+            </a:r>
+          </a:p>
+          <a:p>
+            <a:pPr algn="just"/>
+            <a:endParaRPr lang="en-US" sz="3200" b="1" i="1" dirty="0" smtClean="0">
+              <a:solidFill>
+                <a:schemeClr val="bg1"/>
+              </a:solidFill>
+            </a:endParaRPr>
+          </a:p>
+          <a:p>
+            <a:pPr algn="just"/>
+            <a:r>
+              <a:rPr lang="en-US" sz="3200" b="1" i="1" dirty="0" smtClean="0">
+                <a:solidFill>
+                  <a:schemeClr val="bg1"/>
+                </a:solidFill>
+              </a:rPr>
+              <a:t>It is this file that makes possible the special calibrations mentioned here.  Each one is a specialized re-arranging, slicing, or filtering of that event list and associated metadata followed by re-extraction with </a:t>
+            </a:r>
+            <a:r>
+              <a:rPr lang="en-US" sz="3200" b="1" i="1" dirty="0" err="1" smtClean="0">
+                <a:solidFill>
+                  <a:schemeClr val="bg1"/>
+                </a:solidFill>
+              </a:rPr>
+              <a:t>CalCOS</a:t>
+            </a:r>
+            <a:r>
+              <a:rPr lang="en-US" sz="3200" b="1" i="1" dirty="0" smtClean="0">
+                <a:solidFill>
+                  <a:schemeClr val="bg1"/>
+                </a:solidFill>
+              </a:rPr>
+              <a:t> or other specialized software.  For more information, please review the </a:t>
+            </a:r>
+            <a:r>
+              <a:rPr lang="en-US" sz="3200" b="1" i="1" dirty="0" smtClean="0">
+                <a:solidFill>
+                  <a:schemeClr val="bg1"/>
+                </a:solidFill>
+                <a:hlinkClick r:id="rId13"/>
+              </a:rPr>
+              <a:t>COS Data Products</a:t>
+            </a:r>
+            <a:r>
+              <a:rPr lang="en-US" sz="3200" b="1" i="1" dirty="0" smtClean="0">
+                <a:solidFill>
+                  <a:schemeClr val="bg1"/>
+                </a:solidFill>
+              </a:rPr>
+              <a:t> section of the current Data Handbook.</a:t>
+            </a:r>
+            <a:endParaRPr lang="en-US" sz="3200" b="1" i="1" dirty="0" smtClean="0">
+              <a:solidFill>
+                <a:schemeClr val="bg1"/>
+              </a:solidFill>
+            </a:endParaRPr>
+          </a:p>
+        </p:txBody>
+      </p:sp>
     </p:spTree>
     <p:extLst>
       <p:ext uri="{BB962C8B-B14F-4D97-AF65-F5344CB8AC3E}">

</xml_diff>

<commit_message>
Revised poster with team comments
</commit_message>
<xml_diff>
--- a/AAS_224_ELY.pptx
+++ b/AAS_224_ELY.pptx
@@ -3104,14 +3104,14 @@
           <p:nvPr/>
         </p:nvPicPr>
         <p:blipFill rotWithShape="1">
-          <a:blip r:embed="rId2">
+          <a:blip r:embed="rId2" cstate="print">
             <a:extLst>
               <a:ext uri="{28A0092B-C50C-407E-A947-70E740481C1C}">
-                <a14:useLocalDpi xmlns:a14="http://schemas.microsoft.com/office/drawing/2010/main" val="0"/>
+                <a14:useLocalDpi xmlns:a14="http://schemas.microsoft.com/office/drawing/2010/main"/>
               </a:ext>
             </a:extLst>
           </a:blip>
-          <a:srcRect t="3165" b="62041"/>
+          <a:srcRect/>
           <a:stretch/>
         </p:blipFill>
         <p:spPr>
@@ -3133,14 +3133,14 @@
           <p:nvPr/>
         </p:nvPicPr>
         <p:blipFill rotWithShape="1">
-          <a:blip r:embed="rId2">
+          <a:blip r:embed="rId2" cstate="print">
             <a:extLst>
               <a:ext uri="{28A0092B-C50C-407E-A947-70E740481C1C}">
-                <a14:useLocalDpi xmlns:a14="http://schemas.microsoft.com/office/drawing/2010/main" val="0"/>
+                <a14:useLocalDpi xmlns:a14="http://schemas.microsoft.com/office/drawing/2010/main"/>
               </a:ext>
             </a:extLst>
           </a:blip>
-          <a:srcRect t="3165" b="62041"/>
+          <a:srcRect/>
           <a:stretch/>
         </p:blipFill>
         <p:spPr>
@@ -3182,7 +3182,7 @@
                   <a:schemeClr val="bg1"/>
                 </a:solidFill>
               </a:rPr>
-              <a:t>Advanced Time-domain Calibrations and Data-</a:t>
+              <a:t>Advanced Time</a:t>
             </a:r>
             <a:r>
               <a:rPr lang="en-US" dirty="0" smtClean="0">
@@ -3190,7 +3190,47 @@
                   <a:schemeClr val="bg1"/>
                 </a:solidFill>
               </a:rPr>
-              <a:t>reduction Techniques </a:t>
+              <a:t>-Domain </a:t>
+            </a:r>
+            <a:r>
+              <a:rPr lang="en-US" dirty="0">
+                <a:solidFill>
+                  <a:schemeClr val="bg1"/>
+                </a:solidFill>
+              </a:rPr>
+              <a:t>Calibrations and Data</a:t>
+            </a:r>
+            <a:r>
+              <a:rPr lang="en-US" dirty="0" smtClean="0">
+                <a:solidFill>
+                  <a:schemeClr val="bg1"/>
+                </a:solidFill>
+              </a:rPr>
+              <a:t>-</a:t>
+            </a:r>
+            <a:r>
+              <a:rPr lang="en-US" dirty="0">
+                <a:solidFill>
+                  <a:schemeClr val="bg1"/>
+                </a:solidFill>
+              </a:rPr>
+              <a:t>R</a:t>
+            </a:r>
+            <a:r>
+              <a:rPr lang="en-US" dirty="0" smtClean="0">
+                <a:solidFill>
+                  <a:schemeClr val="bg1"/>
+                </a:solidFill>
+              </a:rPr>
+              <a:t>eduction </a:t>
+            </a:r>
+            <a:r>
+              <a:rPr lang="en-US" dirty="0" smtClean="0">
+                <a:solidFill>
+                  <a:schemeClr val="bg1"/>
+                </a:solidFill>
+              </a:rPr>
+              <a:t>Techniques </a:t>
             </a:r>
             <a:r>
               <a:rPr lang="en-US" dirty="0">
@@ -3217,7 +3257,7 @@
           <a:p>
             <a:pPr algn="ctr"/>
             <a:r>
-              <a:rPr lang="en-US" sz="3600" b="1" u="sng" dirty="0">
+              <a:rPr lang="en-US" sz="3600" b="1" dirty="0">
                 <a:solidFill>
                   <a:srgbClr val="FFFFFF"/>
                 </a:solidFill>
@@ -3254,7 +3294,39 @@
                   <a:srgbClr val="FFFFFF"/>
                 </a:solidFill>
               </a:rPr>
-              <a:t>, John H. Debes</a:t>
+              <a:t>, John H. </a:t>
+            </a:r>
+            <a:r>
+              <a:rPr lang="en-US" sz="3600" dirty="0" smtClean="0">
+                <a:solidFill>
+                  <a:srgbClr val="FFFFFF"/>
+                </a:solidFill>
+              </a:rPr>
+              <a:t>Debes</a:t>
+            </a:r>
+            <a:r>
+              <a:rPr lang="en-US" sz="3600" baseline="30000" dirty="0" smtClean="0">
+                <a:solidFill>
+                  <a:srgbClr val="FFFFFF"/>
+                </a:solidFill>
+              </a:rPr>
+              <a:t>1</a:t>
+            </a:r>
+            <a:r>
+              <a:rPr lang="en-US" sz="3600" dirty="0" smtClean="0">
+                <a:solidFill>
+                  <a:srgbClr val="FFFFFF"/>
+                </a:solidFill>
+              </a:rPr>
+              <a:t>, </a:t>
+            </a:r>
+            <a:r>
+              <a:rPr lang="en-US" sz="3600" dirty="0">
+                <a:solidFill>
+                  <a:srgbClr val="FFFFFF"/>
+                </a:solidFill>
+              </a:rPr>
+              <a:t>Svea Hernandez</a:t>
             </a:r>
             <a:r>
               <a:rPr lang="en-US" sz="3600" baseline="30000" dirty="0">
@@ -3262,7 +3334,7 @@
                   <a:srgbClr val="FFFFFF"/>
                 </a:solidFill>
               </a:rPr>
-              <a:t>1, 3</a:t>
+              <a:t>1</a:t>
             </a:r>
             <a:r>
               <a:rPr lang="en-US" sz="3600" dirty="0">
@@ -3270,15 +3342,95 @@
                   <a:srgbClr val="FFFFFF"/>
                 </a:solidFill>
               </a:rPr>
+              <a:t>, Philip Hodge</a:t>
+            </a:r>
+            <a:r>
+              <a:rPr lang="en-US" sz="3600" baseline="30000" dirty="0">
+                <a:solidFill>
+                  <a:srgbClr val="FFFFFF"/>
+                </a:solidFill>
+              </a:rPr>
+              <a:t>1</a:t>
+            </a:r>
+            <a:r>
+              <a:rPr lang="en-US" sz="3600" dirty="0">
+                <a:solidFill>
+                  <a:srgbClr val="FFFFFF"/>
+                </a:solidFill>
+              </a:rPr>
+              <a:t>, Robert I. Jedrzejewski</a:t>
+            </a:r>
+            <a:r>
+              <a:rPr lang="en-US" sz="3600" baseline="30000" dirty="0">
+                <a:solidFill>
+                  <a:srgbClr val="FFFFFF"/>
+                </a:solidFill>
+              </a:rPr>
+              <a:t>1</a:t>
+            </a:r>
+            <a:r>
+              <a:rPr lang="en-US" sz="3600" dirty="0">
+                <a:solidFill>
+                  <a:srgbClr val="FFFFFF"/>
+                </a:solidFill>
+              </a:rPr>
+              <a:t>, Kevin Lindsay</a:t>
+            </a:r>
+            <a:r>
+              <a:rPr lang="en-US" sz="3600" baseline="30000" dirty="0">
+                <a:solidFill>
+                  <a:srgbClr val="FFFFFF"/>
+                </a:solidFill>
+              </a:rPr>
+              <a:t>1</a:t>
+            </a:r>
+            <a:r>
+              <a:rPr lang="en-US" sz="3600" dirty="0">
+                <a:solidFill>
+                  <a:srgbClr val="FFFFFF"/>
+                </a:solidFill>
+              </a:rPr>
               <a:t>, </a:t>
             </a:r>
             <a:r>
-              <a:rPr lang="en-US" sz="3600" dirty="0" err="1">
-                <a:solidFill>
-                  <a:srgbClr val="FFFFFF"/>
-                </a:solidFill>
-              </a:rPr>
-              <a:t>Svea</a:t>
+              <a:rPr lang="en-US" sz="3600" dirty="0" smtClean="0">
+                <a:solidFill>
+                  <a:srgbClr val="FFFFFF"/>
+                </a:solidFill>
+              </a:rPr>
+              <a:t>Sean Lockwood</a:t>
+            </a:r>
+            <a:r>
+              <a:rPr lang="en-US" sz="3600" baseline="30000" dirty="0">
+                <a:solidFill>
+                  <a:srgbClr val="FFFFFF"/>
+                </a:solidFill>
+              </a:rPr>
+              <a:t>1</a:t>
+            </a:r>
+            <a:r>
+              <a:rPr lang="en-US" sz="3600" dirty="0" smtClean="0">
+                <a:solidFill>
+                  <a:srgbClr val="FFFFFF"/>
+                </a:solidFill>
+              </a:rPr>
+              <a:t>, Derck Massa</a:t>
+            </a:r>
+            <a:r>
+              <a:rPr lang="en-US" sz="3600" baseline="30000" dirty="0" smtClean="0">
+                <a:solidFill>
+                  <a:srgbClr val="FFFFFF"/>
+                </a:solidFill>
+              </a:rPr>
+              <a:t>1</a:t>
+            </a:r>
+            <a:r>
+              <a:rPr lang="en-US" sz="3600" dirty="0" smtClean="0">
+                <a:solidFill>
+                  <a:srgbClr val="FFFFFF"/>
+                </a:solidFill>
+              </a:rPr>
+              <a:t>, </a:t>
             </a:r>
             <a:r>
               <a:rPr lang="en-US" sz="3600" dirty="0">
@@ -3286,7 +3438,39 @@
                   <a:srgbClr val="FFFFFF"/>
                 </a:solidFill>
               </a:rPr>
-              <a:t> Hernandez</a:t>
+              <a:t>Cristina M. </a:t>
+            </a:r>
+            <a:r>
+              <a:rPr lang="en-US" sz="3600" dirty="0" smtClean="0">
+                <a:solidFill>
+                  <a:srgbClr val="FFFFFF"/>
+                </a:solidFill>
+              </a:rPr>
+              <a:t>Oliveira</a:t>
+            </a:r>
+            <a:r>
+              <a:rPr lang="en-US" sz="3600" baseline="30000" dirty="0" smtClean="0">
+                <a:solidFill>
+                  <a:srgbClr val="FFFFFF"/>
+                </a:solidFill>
+              </a:rPr>
+              <a:t>1</a:t>
+            </a:r>
+            <a:r>
+              <a:rPr lang="en-US" sz="3600" dirty="0" smtClean="0">
+                <a:solidFill>
+                  <a:srgbClr val="FFFFFF"/>
+                </a:solidFill>
+              </a:rPr>
+              <a:t>, </a:t>
+            </a:r>
+            <a:r>
+              <a:rPr lang="en-US" sz="3600" dirty="0">
+                <a:solidFill>
+                  <a:srgbClr val="FFFFFF"/>
+                </a:solidFill>
+              </a:rPr>
+              <a:t>Steven V. Penton</a:t>
             </a:r>
             <a:r>
               <a:rPr lang="en-US" sz="3600" baseline="30000" dirty="0">
@@ -3302,7 +3486,7 @@
                   <a:srgbClr val="FFFFFF"/>
                 </a:solidFill>
               </a:rPr>
-              <a:t>, Philip Hodge</a:t>
+              <a:t>, Charles R. Proffitt</a:t>
             </a:r>
             <a:r>
               <a:rPr lang="en-US" sz="3600" baseline="30000" dirty="0">
@@ -3310,15 +3494,47 @@
                   <a:srgbClr val="FFFFFF"/>
                 </a:solidFill>
               </a:rPr>
+              <a:t>2, 1</a:t>
+            </a:r>
+            <a:r>
+              <a:rPr lang="en-US" sz="3600" dirty="0">
+                <a:solidFill>
+                  <a:srgbClr val="FFFFFF"/>
+                </a:solidFill>
+              </a:rPr>
+              <a:t>, Julia Roman-</a:t>
+            </a:r>
+            <a:r>
+              <a:rPr lang="en-US" sz="3600" dirty="0" smtClean="0">
+                <a:solidFill>
+                  <a:srgbClr val="FFFFFF"/>
+                </a:solidFill>
+              </a:rPr>
+              <a:t>Duval</a:t>
+            </a:r>
+            <a:r>
+              <a:rPr lang="en-US" sz="3600" baseline="30000" dirty="0" smtClean="0">
+                <a:solidFill>
+                  <a:srgbClr val="FFFFFF"/>
+                </a:solidFill>
+              </a:rPr>
               <a:t>1</a:t>
             </a:r>
             <a:r>
+              <a:rPr lang="en-US" sz="3600" dirty="0" smtClean="0">
+                <a:solidFill>
+                  <a:srgbClr val="FFFFFF"/>
+                </a:solidFill>
+              </a:rPr>
+              <a:t>, </a:t>
+            </a:r>
+            <a:r>
               <a:rPr lang="en-US" sz="3600" dirty="0">
                 <a:solidFill>
                   <a:srgbClr val="FFFFFF"/>
                 </a:solidFill>
               </a:rPr>
-              <a:t>, Robert I. Jedrzejewski</a:t>
+              <a:t>David J. Sahnow</a:t>
             </a:r>
             <a:r>
               <a:rPr lang="en-US" sz="3600" baseline="30000" dirty="0">
@@ -3334,10 +3550,18 @@
                   <a:srgbClr val="FFFFFF"/>
                 </a:solidFill>
               </a:rPr>
-              <a:t>, Kevin Lindsay</a:t>
-            </a:r>
-            <a:r>
-              <a:rPr lang="en-US" sz="3600" baseline="30000" dirty="0">
+              <a:t>, Hugues </a:t>
+            </a:r>
+            <a:r>
+              <a:rPr lang="en-US" sz="3600" dirty="0" smtClean="0">
+                <a:solidFill>
+                  <a:srgbClr val="FFFFFF"/>
+                </a:solidFill>
+              </a:rPr>
+              <a:t>Sana</a:t>
+            </a:r>
+            <a:r>
+              <a:rPr lang="en-US" sz="3600" baseline="30000" dirty="0" smtClean="0">
                 <a:solidFill>
                   <a:srgbClr val="FFFFFF"/>
                 </a:solidFill>
@@ -3345,188 +3569,52 @@
               <a:t>1</a:t>
             </a:r>
             <a:r>
+              <a:rPr lang="en-US" sz="3600" dirty="0" smtClean="0">
+                <a:solidFill>
+                  <a:srgbClr val="FFFFFF"/>
+                </a:solidFill>
+              </a:rPr>
+              <a:t>, </a:t>
+            </a:r>
+            <a:r>
               <a:rPr lang="en-US" sz="3600" dirty="0">
                 <a:solidFill>
                   <a:srgbClr val="FFFFFF"/>
                 </a:solidFill>
               </a:rPr>
+              <a:t>Paule </a:t>
+            </a:r>
+            <a:r>
+              <a:rPr lang="en-US" sz="3600" dirty="0" smtClean="0">
+                <a:solidFill>
+                  <a:srgbClr val="FFFFFF"/>
+                </a:solidFill>
+              </a:rPr>
+              <a:t>Sonnentrucker</a:t>
+            </a:r>
+            <a:r>
+              <a:rPr lang="en-US" sz="3600" baseline="30000" dirty="0" smtClean="0">
+                <a:solidFill>
+                  <a:srgbClr val="FFFFFF"/>
+                </a:solidFill>
+              </a:rPr>
+              <a:t>1</a:t>
+            </a:r>
+            <a:r>
+              <a:rPr lang="en-US" sz="3600" dirty="0" smtClean="0">
+                <a:solidFill>
+                  <a:srgbClr val="FFFFFF"/>
+                </a:solidFill>
+              </a:rPr>
               <a:t>, </a:t>
             </a:r>
             <a:r>
-              <a:rPr lang="en-US" sz="3600" dirty="0" err="1">
-                <a:solidFill>
-                  <a:srgbClr val="FFFFFF"/>
-                </a:solidFill>
-              </a:rPr>
-              <a:t>Derck</a:t>
-            </a:r>
-            <a:r>
               <a:rPr lang="en-US" sz="3600" dirty="0">
                 <a:solidFill>
                   <a:srgbClr val="FFFFFF"/>
                 </a:solidFill>
               </a:rPr>
-              <a:t> Massa</a:t>
-            </a:r>
-            <a:r>
-              <a:rPr lang="en-US" sz="3600" baseline="30000" dirty="0">
-                <a:solidFill>
-                  <a:srgbClr val="FFFFFF"/>
-                </a:solidFill>
-              </a:rPr>
-              <a:t>1, 4</a:t>
-            </a:r>
-            <a:r>
-              <a:rPr lang="en-US" sz="3600" dirty="0">
-                <a:solidFill>
-                  <a:srgbClr val="FFFFFF"/>
-                </a:solidFill>
-              </a:rPr>
-              <a:t>, Cristina M. Oliveira</a:t>
-            </a:r>
-            <a:r>
-              <a:rPr lang="en-US" sz="3600" baseline="30000" dirty="0">
-                <a:solidFill>
-                  <a:srgbClr val="FFFFFF"/>
-                </a:solidFill>
-              </a:rPr>
-              <a:t>1, 3</a:t>
-            </a:r>
-            <a:r>
-              <a:rPr lang="en-US" sz="3600" dirty="0">
-                <a:solidFill>
-                  <a:srgbClr val="FFFFFF"/>
-                </a:solidFill>
-              </a:rPr>
-              <a:t>, Steven V. Penton</a:t>
-            </a:r>
-            <a:r>
-              <a:rPr lang="en-US" sz="3600" baseline="30000" dirty="0">
-                <a:solidFill>
-                  <a:srgbClr val="FFFFFF"/>
-                </a:solidFill>
-              </a:rPr>
-              <a:t>1</a:t>
-            </a:r>
-            <a:r>
-              <a:rPr lang="en-US" sz="3600" dirty="0">
-                <a:solidFill>
-                  <a:srgbClr val="FFFFFF"/>
-                </a:solidFill>
-              </a:rPr>
-              <a:t>, Charles R. Proffitt</a:t>
-            </a:r>
-            <a:r>
-              <a:rPr lang="en-US" sz="3600" baseline="30000" dirty="0">
-                <a:solidFill>
-                  <a:srgbClr val="FFFFFF"/>
-                </a:solidFill>
-              </a:rPr>
-              <a:t>2, 1</a:t>
-            </a:r>
-            <a:r>
-              <a:rPr lang="en-US" sz="3600" dirty="0">
-                <a:solidFill>
-                  <a:srgbClr val="FFFFFF"/>
-                </a:solidFill>
-              </a:rPr>
-              <a:t>, Julia Roman-Duval</a:t>
-            </a:r>
-            <a:r>
-              <a:rPr lang="en-US" sz="3600" baseline="30000" dirty="0">
-                <a:solidFill>
-                  <a:srgbClr val="FFFFFF"/>
-                </a:solidFill>
-              </a:rPr>
-              <a:t>1, 3</a:t>
-            </a:r>
-            <a:r>
-              <a:rPr lang="en-US" sz="3600" dirty="0">
-                <a:solidFill>
-                  <a:srgbClr val="FFFFFF"/>
-                </a:solidFill>
-              </a:rPr>
-              <a:t>, David J. Sahnow</a:t>
-            </a:r>
-            <a:r>
-              <a:rPr lang="en-US" sz="3600" baseline="30000" dirty="0">
-                <a:solidFill>
-                  <a:srgbClr val="FFFFFF"/>
-                </a:solidFill>
-              </a:rPr>
-              <a:t>1</a:t>
-            </a:r>
-            <a:r>
-              <a:rPr lang="en-US" sz="3600" dirty="0">
-                <a:solidFill>
-                  <a:srgbClr val="FFFFFF"/>
-                </a:solidFill>
-              </a:rPr>
-              <a:t>, </a:t>
-            </a:r>
-            <a:r>
-              <a:rPr lang="en-US" sz="3600" dirty="0" err="1">
-                <a:solidFill>
-                  <a:srgbClr val="FFFFFF"/>
-                </a:solidFill>
-              </a:rPr>
-              <a:t>Hugues</a:t>
-            </a:r>
-            <a:r>
-              <a:rPr lang="en-US" sz="3600" dirty="0">
-                <a:solidFill>
-                  <a:srgbClr val="FFFFFF"/>
-                </a:solidFill>
-              </a:rPr>
-              <a:t> Sana</a:t>
-            </a:r>
-            <a:r>
-              <a:rPr lang="en-US" sz="3600" baseline="30000" dirty="0">
-                <a:solidFill>
-                  <a:srgbClr val="FFFFFF"/>
-                </a:solidFill>
-              </a:rPr>
-              <a:t>1, 3</a:t>
-            </a:r>
-            <a:r>
-              <a:rPr lang="en-US" sz="3600" dirty="0">
-                <a:solidFill>
-                  <a:srgbClr val="FFFFFF"/>
-                </a:solidFill>
-              </a:rPr>
-              <a:t>, </a:t>
-            </a:r>
-            <a:r>
-              <a:rPr lang="en-US" sz="3600" dirty="0" err="1">
-                <a:solidFill>
-                  <a:srgbClr val="FFFFFF"/>
-                </a:solidFill>
-              </a:rPr>
-              <a:t>Paule</a:t>
-            </a:r>
-            <a:r>
-              <a:rPr lang="en-US" sz="3600" dirty="0">
-                <a:solidFill>
-                  <a:srgbClr val="FFFFFF"/>
-                </a:solidFill>
-              </a:rPr>
-              <a:t> Sonnentrucker</a:t>
-            </a:r>
-            <a:r>
-              <a:rPr lang="en-US" sz="3600" baseline="30000" dirty="0">
-                <a:solidFill>
-                  <a:srgbClr val="FFFFFF"/>
-                </a:solidFill>
-              </a:rPr>
-              <a:t>1, 3</a:t>
-            </a:r>
-            <a:r>
-              <a:rPr lang="en-US" sz="3600" dirty="0">
-                <a:solidFill>
-                  <a:srgbClr val="FFFFFF"/>
-                </a:solidFill>
-              </a:rPr>
-              <a:t>, Joanna M. Taylor</a:t>
+              <a:t>Joanna M. Taylor</a:t>
             </a:r>
             <a:r>
               <a:rPr lang="en-US" sz="3600" baseline="30000" dirty="0">
@@ -3574,7 +3662,15 @@
                   <a:srgbClr val="FFFFFF"/>
                 </a:solidFill>
               </a:rPr>
-              <a:t>STSCI, 2</a:t>
+              <a:t>STScI</a:t>
+            </a:r>
+            <a:r>
+              <a:rPr lang="en-US" sz="3600" dirty="0" smtClean="0">
+                <a:solidFill>
+                  <a:srgbClr val="FFFFFF"/>
+                </a:solidFill>
+              </a:rPr>
+              <a:t>, 2</a:t>
             </a:r>
             <a:r>
               <a:rPr lang="en-US" sz="3600" dirty="0">
@@ -3590,23 +3686,7 @@
                   <a:srgbClr val="FFFFFF"/>
                 </a:solidFill>
               </a:rPr>
-              <a:t>CSC, 3. ESA, 4</a:t>
-            </a:r>
-            <a:r>
-              <a:rPr lang="en-US" sz="3600" dirty="0">
-                <a:solidFill>
-                  <a:srgbClr val="FFFFFF"/>
-                </a:solidFill>
-              </a:rPr>
-              <a:t>. </a:t>
-            </a:r>
-            <a:r>
-              <a:rPr lang="en-US" sz="3600" dirty="0" smtClean="0">
-                <a:solidFill>
-                  <a:srgbClr val="FFFFFF"/>
-                </a:solidFill>
-              </a:rPr>
-              <a:t>SSI</a:t>
+              <a:t>CS</a:t>
             </a:r>
             <a:endParaRPr lang="en-US" sz="3600" b="1" dirty="0" smtClean="0">
               <a:solidFill>
@@ -3714,15 +3794,15 @@
                   <a:srgbClr val="FFFFFF"/>
                 </a:solidFill>
               </a:rPr>
-              <a:t>The Hubble Space Telescope/Cosmic Origins Spectrograph (HST/COS) detectors have a time-tag mode of observation in which the arrival time of each photon is recorded individually. Although the COS calibration pipeline (</a:t>
-            </a:r>
-            <a:r>
-              <a:rPr lang="en-US" sz="3600" i="1" dirty="0" err="1">
-                <a:solidFill>
-                  <a:srgbClr val="FFFFFF"/>
-                </a:solidFill>
-              </a:rPr>
-              <a:t>CalCOS</a:t>
+              <a:t>The Hubble Space Telescope/Cosmic Origins Spectrograph (HST/COS) detectors have a time-tag mode of observation in which the arrival time of each photon is recorded individually. Although the COS calibration pipeline (CalCOS) makes use of this capability in many aspects of routine processing, there remains a </a:t>
+            </a:r>
+            <a:r>
+              <a:rPr lang="en-US" sz="3600" i="1" dirty="0" smtClean="0">
+                <a:solidFill>
+                  <a:srgbClr val="FFFFFF"/>
+                </a:solidFill>
+              </a:rPr>
+              <a:t>number of </a:t>
             </a:r>
             <a:r>
               <a:rPr lang="en-US" sz="3600" i="1" dirty="0">
@@ -3730,7 +3810,7 @@
                   <a:srgbClr val="FFFFFF"/>
                 </a:solidFill>
               </a:rPr>
-              <a:t>) makes use of this capability in many aspects of routine processing, there remains a number other ways that this information can be used to improve the calibration for specific science cases. This has led to the development of tools and techniques to perform additional calibrations that are not part of the standard data products output by </a:t>
+              <a:t>other ways that this information can be used to improve the calibration for specific science cases. This has led to the development of tools and techniques to perform additional calibrations that are not part of the standard data products output by </a:t>
             </a:r>
             <a:r>
               <a:rPr lang="en-US" sz="3600" i="1" dirty="0" err="1">
@@ -3768,10 +3848,10 @@
           <p:nvPr/>
         </p:nvPicPr>
         <p:blipFill>
-          <a:blip r:embed="rId3">
+          <a:blip r:embed="rId3" cstate="print">
             <a:extLst>
               <a:ext uri="{28A0092B-C50C-407E-A947-70E740481C1C}">
-                <a14:useLocalDpi xmlns:a14="http://schemas.microsoft.com/office/drawing/2010/main" val="0"/>
+                <a14:useLocalDpi xmlns:a14="http://schemas.microsoft.com/office/drawing/2010/main"/>
               </a:ext>
             </a:extLst>
           </a:blip>
@@ -3801,7 +3881,7 @@
           <a:blip r:embed="rId4">
             <a:extLst>
               <a:ext uri="{28A0092B-C50C-407E-A947-70E740481C1C}">
-                <a14:useLocalDpi xmlns:a14="http://schemas.microsoft.com/office/drawing/2010/main" val="0"/>
+                <a14:useLocalDpi xmlns:a14="http://schemas.microsoft.com/office/drawing/2010/main"/>
               </a:ext>
             </a:extLst>
           </a:blip>
@@ -4055,12 +4135,12 @@
           <a:p>
             <a:pPr algn="ctr"/>
             <a:r>
-              <a:rPr lang="en-US" sz="5400" b="1" i="1" dirty="0" err="1" smtClean="0">
-                <a:solidFill>
-                  <a:srgbClr val="FFFFFF"/>
-                </a:solidFill>
-              </a:rPr>
-              <a:t>TimeFilter</a:t>
+              <a:rPr lang="en-US" sz="5400" b="1" i="1" dirty="0" smtClean="0">
+                <a:solidFill>
+                  <a:srgbClr val="FFFFFF"/>
+                </a:solidFill>
+              </a:rPr>
+              <a:t>Day/Night Filtering</a:t>
             </a:r>
             <a:endParaRPr lang="en-US" sz="5400" b="1" i="1" dirty="0" smtClean="0">
               <a:solidFill>
@@ -4084,15 +4164,39 @@
                   <a:srgbClr val="FFFFFF"/>
                 </a:solidFill>
               </a:rPr>
-              <a:t>task can </a:t>
-            </a:r>
-            <a:r>
-              <a:rPr lang="en-US" sz="3200" b="1" i="1" dirty="0" smtClean="0">
-                <a:solidFill>
-                  <a:srgbClr val="FFFFFF"/>
-                </a:solidFill>
-              </a:rPr>
-              <a:t>be used to exclude unwanted times from a COS dataset.  Primarily, this is done to remove the contamination from geo-coronal airglow emission in the COS bandpass, but the data can be filtered on a variety of </a:t>
+              <a:t>module, part of the stsci_python release,</a:t>
+            </a:r>
+            <a:r>
+              <a:rPr lang="en-US" sz="3200" b="1" i="1" dirty="0" smtClean="0">
+                <a:solidFill>
+                  <a:srgbClr val="FFFFFF"/>
+                </a:solidFill>
+              </a:rPr>
+              <a:t> can </a:t>
+            </a:r>
+            <a:r>
+              <a:rPr lang="en-US" sz="3200" b="1" i="1" dirty="0" smtClean="0">
+                <a:solidFill>
+                  <a:srgbClr val="FFFFFF"/>
+                </a:solidFill>
+              </a:rPr>
+              <a:t>be used to exclude unwanted times </a:t>
+            </a:r>
+            <a:r>
+              <a:rPr lang="en-US" sz="3200" b="1" i="1" dirty="0" smtClean="0">
+                <a:solidFill>
+                  <a:srgbClr val="FFFFFF"/>
+                </a:solidFill>
+              </a:rPr>
+              <a:t>from COS datasets.  </a:t>
+            </a:r>
+            <a:r>
+              <a:rPr lang="en-US" sz="3200" b="1" i="1" dirty="0" smtClean="0">
+                <a:solidFill>
+                  <a:srgbClr val="FFFFFF"/>
+                </a:solidFill>
+              </a:rPr>
+              <a:t>Primarily, this is done to remove the contamination from geo-coronal airglow emission in the COS bandpass, but the data can be filtered on a variety of </a:t>
             </a:r>
             <a:r>
               <a:rPr lang="en-US" sz="3200" b="1" i="1" dirty="0" smtClean="0">
@@ -4156,7 +4260,7 @@
                   <a:srgbClr val="FFFFFF"/>
                 </a:solidFill>
               </a:rPr>
-              <a:t>Darkrate</a:t>
+              <a:t>Dark rate</a:t>
             </a:r>
             <a:endParaRPr lang="en-US" sz="3200" b="1" i="1" dirty="0" smtClean="0">
               <a:solidFill>
@@ -4182,7 +4286,7 @@
         </p:nvSpPr>
         <p:spPr>
           <a:xfrm>
-            <a:off x="20428036" y="33680400"/>
+            <a:off x="20428036" y="33636022"/>
             <a:ext cx="19147377" cy="5943600"/>
           </a:xfrm>
           <a:prstGeom prst="roundRect">
@@ -4227,96 +4331,6 @@
           </a:p>
         </p:txBody>
       </p:sp>
-      <p:pic>
-        <p:nvPicPr>
-          <p:cNvPr id="7" name="Picture 6" descr="github_repo.png"/>
-          <p:cNvPicPr>
-            <a:picLocks noChangeAspect="1"/>
-          </p:cNvPicPr>
-          <p:nvPr/>
-        </p:nvPicPr>
-        <p:blipFill>
-          <a:blip r:embed="rId5">
-            <a:extLst>
-              <a:ext uri="{28A0092B-C50C-407E-A947-70E740481C1C}">
-                <a14:useLocalDpi xmlns:a14="http://schemas.microsoft.com/office/drawing/2010/main" val="0"/>
-              </a:ext>
-            </a:extLst>
-          </a:blip>
-          <a:stretch>
-            <a:fillRect/>
-          </a:stretch>
-        </p:blipFill>
-        <p:spPr>
-          <a:xfrm>
-            <a:off x="35435213" y="34958891"/>
-            <a:ext cx="3810000" cy="3810000"/>
-          </a:xfrm>
-          <a:prstGeom prst="rect">
-            <a:avLst/>
-          </a:prstGeom>
-        </p:spPr>
-      </p:pic>
-      <p:pic>
-        <p:nvPicPr>
-          <p:cNvPr id="14" name="Picture 13" descr="spectrum_before.pdf"/>
-          <p:cNvPicPr>
-            <a:picLocks noChangeAspect="1"/>
-          </p:cNvPicPr>
-          <p:nvPr/>
-        </p:nvPicPr>
-        <p:blipFill>
-          <a:blip r:embed="rId6">
-            <a:extLst>
-              <a:ext uri="{28A0092B-C50C-407E-A947-70E740481C1C}">
-                <a14:useLocalDpi xmlns:a14="http://schemas.microsoft.com/office/drawing/2010/main" val="0"/>
-              </a:ext>
-            </a:extLst>
-          </a:blip>
-          <a:stretch>
-            <a:fillRect/>
-          </a:stretch>
-        </p:blipFill>
-        <p:spPr>
-          <a:xfrm>
-            <a:off x="10669970" y="23889989"/>
-            <a:ext cx="8686800" cy="4368701"/>
-          </a:xfrm>
-          <a:prstGeom prst="rect">
-            <a:avLst/>
-          </a:prstGeom>
-        </p:spPr>
-      </p:pic>
-      <p:pic>
-        <p:nvPicPr>
-          <p:cNvPr id="15" name="Picture 14" descr="spectrum_after.pdf"/>
-          <p:cNvPicPr>
-            <a:picLocks noChangeAspect="1"/>
-          </p:cNvPicPr>
-          <p:nvPr/>
-        </p:nvPicPr>
-        <p:blipFill>
-          <a:blip r:embed="rId7">
-            <a:extLst>
-              <a:ext uri="{28A0092B-C50C-407E-A947-70E740481C1C}">
-                <a14:useLocalDpi xmlns:a14="http://schemas.microsoft.com/office/drawing/2010/main" val="0"/>
-              </a:ext>
-            </a:extLst>
-          </a:blip>
-          <a:stretch>
-            <a:fillRect/>
-          </a:stretch>
-        </p:blipFill>
-        <p:spPr>
-          <a:xfrm>
-            <a:off x="10669970" y="31292899"/>
-            <a:ext cx="8686800" cy="4368701"/>
-          </a:xfrm>
-          <a:prstGeom prst="rect">
-            <a:avLst/>
-          </a:prstGeom>
-        </p:spPr>
-      </p:pic>
       <p:sp>
         <p:nvSpPr>
           <p:cNvPr id="114" name="TextBox 113"/>
@@ -4325,8 +4339,8 @@
         </p:nvSpPr>
         <p:spPr>
           <a:xfrm>
-            <a:off x="20589443" y="33747257"/>
-            <a:ext cx="14662763" cy="5847754"/>
+            <a:off x="20599149" y="33731868"/>
+            <a:ext cx="14662763" cy="5355312"/>
           </a:xfrm>
           <a:prstGeom prst="rect">
             <a:avLst/>
@@ -4346,8 +4360,13 @@
                   <a:srgbClr val="FFFFFF"/>
                 </a:solidFill>
               </a:rPr>
-              <a:t>Tutorials</a:t>
-            </a:r>
+              <a:t>Online Tutorials</a:t>
+            </a:r>
+            <a:endParaRPr lang="en-US" sz="5400" b="1" i="1" dirty="0" smtClean="0">
+              <a:solidFill>
+                <a:srgbClr val="FFFFFF"/>
+              </a:solidFill>
+            </a:endParaRPr>
           </a:p>
           <a:p>
             <a:pPr algn="just"/>
@@ -4381,25 +4400,54 @@
                   <a:schemeClr val="bg1"/>
                 </a:solidFill>
               </a:rPr>
-              <a:t>poster format.  As such, In-depth tutorials for each of the topics explained here can be found at the following location. </a:t>
-            </a:r>
-            <a:r>
-              <a:rPr lang="en-US" sz="3200" b="1" i="1" dirty="0" smtClean="0">
-                <a:solidFill>
-                  <a:schemeClr val="bg1"/>
-                </a:solidFill>
-                <a:hlinkClick r:id="rId8"/>
-              </a:rPr>
-              <a:t>https://github.com/justincely/AAS224</a:t>
-            </a:r>
-            <a:r>
-              <a:rPr lang="en-US" sz="3200" b="1" i="1" dirty="0" smtClean="0">
-                <a:solidFill>
-                  <a:schemeClr val="bg1"/>
-                </a:solidFill>
-              </a:rPr>
-              <a:t> </a:t>
-            </a:r>
+              <a:t>poster format.  As such, In-depth </a:t>
+            </a:r>
+            <a:r>
+              <a:rPr lang="en-US" sz="3200" b="1" i="1" dirty="0" smtClean="0">
+                <a:solidFill>
+                  <a:schemeClr val="bg1"/>
+                </a:solidFill>
+              </a:rPr>
+              <a:t>tutorials with step-by-step instructions </a:t>
+            </a:r>
+            <a:r>
+              <a:rPr lang="en-US" sz="3200" b="1" i="1" dirty="0" smtClean="0">
+                <a:solidFill>
+                  <a:schemeClr val="bg1"/>
+                </a:solidFill>
+              </a:rPr>
+              <a:t>for each of the topics explained here can be found </a:t>
+            </a:r>
+            <a:r>
+              <a:rPr lang="en-US" sz="3200" b="1" i="1" dirty="0" smtClean="0">
+                <a:solidFill>
+                  <a:schemeClr val="bg1"/>
+                </a:solidFill>
+              </a:rPr>
+              <a:t>on the web at </a:t>
+            </a:r>
+            <a:r>
+              <a:rPr lang="en-US" sz="3200" b="1" i="1" dirty="0" smtClean="0">
+                <a:solidFill>
+                  <a:schemeClr val="bg1"/>
+                </a:solidFill>
+                <a:hlinkClick r:id="rId5"/>
+              </a:rPr>
+              <a:t>http://justincely.github.io/AAS224/</a:t>
+            </a:r>
+            <a:r>
+              <a:rPr lang="en-US" sz="3200" b="1" i="1" dirty="0" smtClean="0">
+                <a:solidFill>
+                  <a:schemeClr val="bg1"/>
+                </a:solidFill>
+              </a:rPr>
+              <a:t> , or by scanning the QR code to the right.</a:t>
+            </a:r>
+            <a:endParaRPr lang="en-US" sz="3200" b="1" i="1" dirty="0" smtClean="0">
+              <a:solidFill>
+                <a:schemeClr val="bg1"/>
+              </a:solidFill>
+            </a:endParaRPr>
           </a:p>
           <a:p>
             <a:pPr algn="just"/>
@@ -4420,50 +4468,45 @@
               <a:t>This link connects to a </a:t>
             </a:r>
             <a:r>
-              <a:rPr lang="en-US" sz="3200" b="1" i="1" dirty="0" err="1" smtClean="0">
-                <a:solidFill>
-                  <a:schemeClr val="bg1"/>
-                </a:solidFill>
-              </a:rPr>
-              <a:t>GitHub</a:t>
-            </a:r>
-            <a:r>
-              <a:rPr lang="en-US" sz="3200" b="1" i="1" dirty="0" smtClean="0">
-                <a:solidFill>
-                  <a:schemeClr val="bg1"/>
-                </a:solidFill>
-              </a:rPr>
-              <a:t> repository containing step-by-step demonstrations  using the mentioned tools and techniques.  Each tutorial is written in Python and  contained in an </a:t>
-            </a:r>
-            <a:r>
-              <a:rPr lang="en-US" sz="3200" b="1" i="1" dirty="0" err="1" smtClean="0">
-                <a:solidFill>
-                  <a:schemeClr val="bg1"/>
-                </a:solidFill>
-              </a:rPr>
-              <a:t>iPython</a:t>
-            </a:r>
-            <a:r>
-              <a:rPr lang="en-US" sz="3200" b="1" i="1" dirty="0" smtClean="0">
-                <a:solidFill>
-                  <a:schemeClr val="bg1"/>
-                </a:solidFill>
-              </a:rPr>
-              <a:t> notebook such that they can be re-run and modified at will.  PDF and HTML versions of the tutorials, this poster, all plots, and the raw datasets are also included</a:t>
-            </a:r>
-            <a:r>
-              <a:rPr lang="en-US" sz="3200" b="1" i="1" dirty="0" smtClean="0">
-                <a:solidFill>
-                  <a:schemeClr val="bg1"/>
-                </a:solidFill>
-              </a:rPr>
-              <a:t>.  </a:t>
-            </a:r>
-            <a:endParaRPr lang="en-US" sz="3200" b="1" i="1" dirty="0" smtClean="0">
-              <a:solidFill>
-                <a:schemeClr val="bg1"/>
-              </a:solidFill>
-            </a:endParaRPr>
+              <a:rPr lang="en-US" sz="3200" b="1" i="1" dirty="0" smtClean="0">
+                <a:solidFill>
+                  <a:schemeClr val="bg1"/>
+                </a:solidFill>
+              </a:rPr>
+              <a:t>website where HTML tutorials can be viewed.  Additionally, the website links to a Github repository containing the source for this poster and all the tutorials.  </a:t>
+            </a:r>
+            <a:r>
+              <a:rPr lang="en-US" sz="3200" b="1" i="1" dirty="0" smtClean="0">
+                <a:solidFill>
+                  <a:schemeClr val="bg1"/>
+                </a:solidFill>
+              </a:rPr>
+              <a:t>Each </a:t>
+            </a:r>
+            <a:r>
+              <a:rPr lang="en-US" sz="3200" b="1" i="1" dirty="0" smtClean="0">
+                <a:solidFill>
+                  <a:schemeClr val="bg1"/>
+                </a:solidFill>
+              </a:rPr>
+              <a:t>tutorial is written in Python </a:t>
+            </a:r>
+            <a:r>
+              <a:rPr lang="en-US" sz="3200" b="1" i="1" dirty="0" smtClean="0">
+                <a:solidFill>
+                  <a:schemeClr val="bg1"/>
+                </a:solidFill>
+              </a:rPr>
+              <a:t>in the </a:t>
+            </a:r>
+            <a:r>
+              <a:rPr lang="en-US" sz="3200" b="1" i="1" dirty="0" smtClean="0">
+                <a:solidFill>
+                  <a:schemeClr val="bg1"/>
+                </a:solidFill>
+              </a:rPr>
+              <a:t>iPython notebook such that they can be re-run and modified at will. </a:t>
+            </a:r>
           </a:p>
         </p:txBody>
       </p:sp>
@@ -4491,12 +4534,12 @@
           <a:p>
             <a:pPr algn="ctr"/>
             <a:r>
-              <a:rPr lang="en-US" sz="5400" b="1" i="1" dirty="0" err="1" smtClean="0">
-                <a:solidFill>
-                  <a:srgbClr val="FFFFFF"/>
-                </a:solidFill>
-              </a:rPr>
-              <a:t>Lightcurves</a:t>
+              <a:rPr lang="en-US" sz="5400" b="1" i="1" dirty="0" smtClean="0">
+                <a:solidFill>
+                  <a:srgbClr val="FFFFFF"/>
+                </a:solidFill>
+              </a:rPr>
+              <a:t>Light Curves</a:t>
             </a:r>
             <a:endParaRPr lang="en-US" sz="5400" b="1" i="1" dirty="0" smtClean="0">
               <a:solidFill>
@@ -4560,15 +4603,15 @@
                   <a:schemeClr val="bg1"/>
                 </a:solidFill>
               </a:rPr>
-              <a:t>photons with a precision of 32 ms, </a:t>
-            </a:r>
-            <a:r>
-              <a:rPr lang="en-US" sz="3200" b="1" i="1" dirty="0" smtClean="0">
-                <a:solidFill>
-                  <a:schemeClr val="bg1"/>
-                </a:solidFill>
-              </a:rPr>
-              <a:t>which making </a:t>
+              <a:t>photons with a precision of 32 ms</a:t>
+            </a:r>
+            <a:r>
+              <a:rPr lang="en-US" sz="3200" b="1" i="1" dirty="0" smtClean="0">
+                <a:solidFill>
+                  <a:schemeClr val="bg1"/>
+                </a:solidFill>
+              </a:rPr>
+              <a:t>, making </a:t>
             </a:r>
             <a:r>
               <a:rPr lang="en-US" sz="3200" b="1" i="1" dirty="0" smtClean="0">
@@ -4603,24 +4646,24 @@
                   <a:schemeClr val="bg1"/>
                 </a:solidFill>
               </a:rPr>
-              <a:t>Additionally, the spatial information associated with each event makes it possible include only specific wavelength or detector regions during extraction.  Given adequate signal-to-noise, multiple lightcurves over different wavelengths can be extracted from a single dataset; providing the means to perform wavelength-dependent variability studies.</a:t>
+              <a:t>Additionally, the spatial information associated with each event makes it possible to include only specific wavelength or detector regions during extraction.  Given adequate signal-to-noise, multiple lightcurves over different wavelengths can be extracted from a single dataset; providing the means to perform wavelength-dependent variability studies.</a:t>
             </a:r>
           </a:p>
         </p:txBody>
       </p:sp>
       <p:pic>
         <p:nvPicPr>
-          <p:cNvPr id="16" name="Picture 15" descr="spectrum_vs_lightcurve.pdf"/>
+          <p:cNvPr id="18" name="Picture 17" descr="lightcurve_webpage.png"/>
           <p:cNvPicPr>
             <a:picLocks noChangeAspect="1"/>
           </p:cNvPicPr>
           <p:nvPr/>
         </p:nvPicPr>
         <p:blipFill>
-          <a:blip r:embed="rId9">
+          <a:blip r:embed="rId6">
             <a:extLst>
               <a:ext uri="{28A0092B-C50C-407E-A947-70E740481C1C}">
-                <a14:useLocalDpi xmlns:a14="http://schemas.microsoft.com/office/drawing/2010/main" val="0"/>
+                <a14:useLocalDpi xmlns:a14="http://schemas.microsoft.com/office/drawing/2010/main"/>
               </a:ext>
             </a:extLst>
           </a:blip>
@@ -4630,27 +4673,321 @@
         </p:blipFill>
         <p:spPr>
           <a:xfrm>
-            <a:off x="768121" y="26437047"/>
-            <a:ext cx="8686800" cy="4575997"/>
+            <a:off x="7632699" y="37472630"/>
+            <a:ext cx="1911121" cy="1911121"/>
           </a:xfrm>
           <a:prstGeom prst="rect">
             <a:avLst/>
           </a:prstGeom>
         </p:spPr>
       </p:pic>
+      <p:sp>
+        <p:nvSpPr>
+          <p:cNvPr id="116" name="TextBox 115"/>
+          <p:cNvSpPr txBox="1"/>
+          <p:nvPr/>
+        </p:nvSpPr>
+        <p:spPr>
+          <a:xfrm>
+            <a:off x="616430" y="34579530"/>
+            <a:ext cx="8927391" cy="2893100"/>
+          </a:xfrm>
+          <a:prstGeom prst="rect">
+            <a:avLst/>
+          </a:prstGeom>
+          <a:noFill/>
+        </p:spPr>
+        <p:txBody>
+          <a:bodyPr wrap="square" rtlCol="0">
+            <a:spAutoFit/>
+          </a:bodyPr>
+          <a:lstStyle/>
+          <a:p>
+            <a:pPr algn="ctr"/>
+            <a:r>
+              <a:rPr lang="en-US" sz="5400" b="1" i="1" dirty="0">
+                <a:solidFill>
+                  <a:srgbClr val="FFFFFF"/>
+                </a:solidFill>
+              </a:rPr>
+              <a:t>L</a:t>
+            </a:r>
+            <a:r>
+              <a:rPr lang="en-US" sz="5400" b="1" i="1" dirty="0" smtClean="0">
+                <a:solidFill>
+                  <a:srgbClr val="FFFFFF"/>
+                </a:solidFill>
+              </a:rPr>
+              <a:t>ightcurve Software</a:t>
+            </a:r>
+          </a:p>
+          <a:p>
+            <a:pPr algn="just"/>
+            <a:r>
+              <a:rPr lang="en-US" sz="3200" b="1" i="1" dirty="0" smtClean="0">
+                <a:solidFill>
+                  <a:schemeClr val="bg1"/>
+                </a:solidFill>
+              </a:rPr>
+              <a:t>The </a:t>
+            </a:r>
+            <a:r>
+              <a:rPr lang="en-US" sz="3200" b="1" i="1" dirty="0" smtClean="0">
+                <a:solidFill>
+                  <a:schemeClr val="bg1"/>
+                </a:solidFill>
+              </a:rPr>
+              <a:t>library used to extract the lightcurves on this poster </a:t>
+            </a:r>
+            <a:r>
+              <a:rPr lang="en-US" sz="3200" b="1" i="1" dirty="0" smtClean="0">
+                <a:solidFill>
+                  <a:schemeClr val="bg1"/>
+                </a:solidFill>
+              </a:rPr>
+              <a:t>is an open-source package maintained by Justin Ely.  The COS Team at STScI makes no claims to it’s scientific validity.</a:t>
+            </a:r>
+            <a:endParaRPr lang="en-US" sz="3200" b="1" i="1" dirty="0" smtClean="0">
+              <a:solidFill>
+                <a:schemeClr val="bg1"/>
+              </a:solidFill>
+            </a:endParaRPr>
+          </a:p>
+        </p:txBody>
+      </p:sp>
+      <p:sp>
+        <p:nvSpPr>
+          <p:cNvPr id="117" name="TextBox 116"/>
+          <p:cNvSpPr txBox="1"/>
+          <p:nvPr/>
+        </p:nvSpPr>
+        <p:spPr>
+          <a:xfrm>
+            <a:off x="659285" y="37629975"/>
+            <a:ext cx="6792380" cy="1569660"/>
+          </a:xfrm>
+          <a:prstGeom prst="rect">
+            <a:avLst/>
+          </a:prstGeom>
+          <a:noFill/>
+        </p:spPr>
+        <p:txBody>
+          <a:bodyPr wrap="square" rtlCol="0">
+            <a:spAutoFit/>
+          </a:bodyPr>
+          <a:lstStyle/>
+          <a:p>
+            <a:pPr algn="just"/>
+            <a:r>
+              <a:rPr lang="en-US" sz="2400" b="1" i="1" dirty="0">
+                <a:solidFill>
+                  <a:schemeClr val="bg1"/>
+                </a:solidFill>
+              </a:rPr>
+              <a:t>It is available on both GitHub and the Python Package Index.  You can find more information, download the source, or contribute to the library at </a:t>
+            </a:r>
+            <a:endParaRPr lang="en-US" sz="2400" b="1" i="1" dirty="0" smtClean="0">
+              <a:solidFill>
+                <a:srgbClr val="FFFFFF"/>
+              </a:solidFill>
+              <a:hlinkClick r:id="rId7"/>
+            </a:endParaRPr>
+          </a:p>
+          <a:p>
+            <a:pPr algn="ctr"/>
+            <a:r>
+              <a:rPr lang="en-US" sz="2400" b="1" i="1" dirty="0" smtClean="0">
+                <a:solidFill>
+                  <a:srgbClr val="FFFFFF"/>
+                </a:solidFill>
+                <a:hlinkClick r:id="rId7"/>
+              </a:rPr>
+              <a:t>http</a:t>
+            </a:r>
+            <a:r>
+              <a:rPr lang="en-US" sz="2400" b="1" i="1" dirty="0" smtClean="0">
+                <a:solidFill>
+                  <a:srgbClr val="FFFFFF"/>
+                </a:solidFill>
+                <a:hlinkClick r:id="rId7"/>
+              </a:rPr>
+              <a:t>://justincely.github.io/lightcurve/</a:t>
+            </a:r>
+            <a:endParaRPr lang="en-US" sz="2400" b="1" i="1" dirty="0" smtClean="0">
+              <a:solidFill>
+                <a:srgbClr val="FFFFFF"/>
+              </a:solidFill>
+            </a:endParaRPr>
+          </a:p>
+        </p:txBody>
+      </p:sp>
+      <p:sp>
+        <p:nvSpPr>
+          <p:cNvPr id="118" name="TextBox 117"/>
+          <p:cNvSpPr txBox="1"/>
+          <p:nvPr/>
+        </p:nvSpPr>
+        <p:spPr>
+          <a:xfrm>
+            <a:off x="20589443" y="10175128"/>
+            <a:ext cx="8949985" cy="10279739"/>
+          </a:xfrm>
+          <a:prstGeom prst="rect">
+            <a:avLst/>
+          </a:prstGeom>
+          <a:noFill/>
+        </p:spPr>
+        <p:txBody>
+          <a:bodyPr wrap="square" rtlCol="0">
+            <a:spAutoFit/>
+          </a:bodyPr>
+          <a:lstStyle/>
+          <a:p>
+            <a:pPr algn="ctr"/>
+            <a:r>
+              <a:rPr lang="en-US" sz="5400" b="1" i="1" dirty="0" smtClean="0">
+                <a:solidFill>
+                  <a:srgbClr val="FFFFFF"/>
+                </a:solidFill>
+              </a:rPr>
+              <a:t>Extracting Sub-Exposures</a:t>
+            </a:r>
+            <a:endParaRPr lang="en-US" sz="5400" b="1" i="1" dirty="0" smtClean="0">
+              <a:solidFill>
+                <a:srgbClr val="FFFFFF"/>
+              </a:solidFill>
+            </a:endParaRPr>
+          </a:p>
+          <a:p>
+            <a:pPr algn="just"/>
+            <a:r>
+              <a:rPr lang="en-US" sz="3200" b="1" i="1" dirty="0" smtClean="0">
+                <a:solidFill>
+                  <a:schemeClr val="bg1"/>
+                </a:solidFill>
+              </a:rPr>
+              <a:t>Another way to sample variability in a target is to split up an observation in time and re-extract a dispersed spectrum from each.  This means that, data quality permitting, each individual COS exposure can become a sample of spectra separated in time.</a:t>
+            </a:r>
+          </a:p>
+          <a:p>
+            <a:pPr algn="just"/>
+            <a:endParaRPr lang="en-US" sz="3200" b="1" i="1" dirty="0">
+              <a:solidFill>
+                <a:schemeClr val="bg1"/>
+              </a:solidFill>
+            </a:endParaRPr>
+          </a:p>
+          <a:p>
+            <a:pPr algn="just"/>
+            <a:r>
+              <a:rPr lang="en-US" sz="3200" b="1" i="1" dirty="0" smtClean="0">
+                <a:solidFill>
+                  <a:schemeClr val="bg1"/>
+                </a:solidFill>
+              </a:rPr>
+              <a:t>The Splittag modugle, </a:t>
+            </a:r>
+            <a:r>
+              <a:rPr lang="en-US" sz="3200" b="1" i="1" dirty="0">
+                <a:solidFill>
+                  <a:srgbClr val="FFFFFF"/>
+                </a:solidFill>
+              </a:rPr>
+              <a:t>part of the stsci_python </a:t>
+            </a:r>
+            <a:r>
+              <a:rPr lang="en-US" sz="3200" b="1" i="1" dirty="0" smtClean="0">
+                <a:solidFill>
+                  <a:srgbClr val="FFFFFF"/>
+                </a:solidFill>
+              </a:rPr>
+              <a:t>release, </a:t>
+            </a:r>
+            <a:r>
+              <a:rPr lang="en-US" sz="3200" b="1" i="1" dirty="0" smtClean="0">
+                <a:solidFill>
+                  <a:schemeClr val="bg1"/>
+                </a:solidFill>
+              </a:rPr>
+              <a:t>can be used to separate data by specifying either: </a:t>
+            </a:r>
+          </a:p>
+          <a:p>
+            <a:pPr marL="514350" indent="-514350" algn="ctr">
+              <a:buFont typeface="Arial"/>
+              <a:buChar char="•"/>
+            </a:pPr>
+            <a:r>
+              <a:rPr lang="en-US" sz="3200" b="1" i="1" dirty="0" smtClean="0">
+                <a:solidFill>
+                  <a:schemeClr val="bg1"/>
+                </a:solidFill>
+              </a:rPr>
+              <a:t>Start, stop and increment times</a:t>
+            </a:r>
+          </a:p>
+          <a:p>
+            <a:pPr algn="ctr"/>
+            <a:r>
+              <a:rPr lang="en-US" sz="3200" b="1" i="1" dirty="0" smtClean="0">
+                <a:solidFill>
+                  <a:schemeClr val="bg1"/>
+                </a:solidFill>
+              </a:rPr>
+              <a:t> or </a:t>
+            </a:r>
+          </a:p>
+          <a:p>
+            <a:pPr marL="514350" indent="-514350" algn="ctr">
+              <a:buFont typeface="Arial"/>
+              <a:buChar char="•"/>
+            </a:pPr>
+            <a:r>
+              <a:rPr lang="en-US" sz="3200" b="1" i="1" dirty="0" smtClean="0">
+                <a:solidFill>
+                  <a:schemeClr val="bg1"/>
+                </a:solidFill>
+              </a:rPr>
+              <a:t>An explicit list of time intervals.</a:t>
+            </a:r>
+          </a:p>
+          <a:p>
+            <a:pPr marL="514350" indent="-514350" algn="ctr">
+              <a:buFont typeface="Arial"/>
+              <a:buChar char="•"/>
+            </a:pPr>
+            <a:endParaRPr lang="en-US" sz="3200" b="1" i="1" dirty="0">
+              <a:solidFill>
+                <a:schemeClr val="bg1"/>
+              </a:solidFill>
+            </a:endParaRPr>
+          </a:p>
+          <a:p>
+            <a:pPr algn="just"/>
+            <a:r>
+              <a:rPr lang="en-US" sz="3200" b="1" i="1" dirty="0" smtClean="0">
+                <a:solidFill>
+                  <a:schemeClr val="bg1"/>
+                </a:solidFill>
+              </a:rPr>
+              <a:t>The task will break apart the input corrtag file, copying the events from the specified times to new output files.  After that, simply re-running CalCOS on the newly created corrtag files will re-extract a spectrum from each.</a:t>
+            </a:r>
+          </a:p>
+        </p:txBody>
+      </p:sp>
       <p:pic>
         <p:nvPicPr>
-          <p:cNvPr id="18" name="Picture 17" descr="lightcurve_webpage.png"/>
+          <p:cNvPr id="21" name="Picture 20" descr="eclipse_split.pdf"/>
           <p:cNvPicPr>
             <a:picLocks noChangeAspect="1"/>
           </p:cNvPicPr>
           <p:nvPr/>
         </p:nvPicPr>
         <p:blipFill>
-          <a:blip r:embed="rId10">
+          <a:blip r:embed="rId8">
             <a:extLst>
               <a:ext uri="{28A0092B-C50C-407E-A947-70E740481C1C}">
-                <a14:useLocalDpi xmlns:a14="http://schemas.microsoft.com/office/drawing/2010/main" val="0"/>
+                <a14:useLocalDpi xmlns:a14="http://schemas.microsoft.com/office/drawing/2010/main"/>
               </a:ext>
             </a:extLst>
           </a:blip>
@@ -4660,267 +4997,7 @@
         </p:blipFill>
         <p:spPr>
           <a:xfrm>
-            <a:off x="7451665" y="37291596"/>
-            <a:ext cx="2092156" cy="2092156"/>
-          </a:xfrm>
-          <a:prstGeom prst="rect">
-            <a:avLst/>
-          </a:prstGeom>
-        </p:spPr>
-      </p:pic>
-      <p:sp>
-        <p:nvSpPr>
-          <p:cNvPr id="116" name="TextBox 115"/>
-          <p:cNvSpPr txBox="1"/>
-          <p:nvPr/>
-        </p:nvSpPr>
-        <p:spPr>
-          <a:xfrm>
-            <a:off x="768121" y="34303950"/>
-            <a:ext cx="8686800" cy="3385542"/>
-          </a:xfrm>
-          <a:prstGeom prst="rect">
-            <a:avLst/>
-          </a:prstGeom>
-          <a:noFill/>
-        </p:spPr>
-        <p:txBody>
-          <a:bodyPr wrap="square" rtlCol="0">
-            <a:spAutoFit/>
-          </a:bodyPr>
-          <a:lstStyle/>
-          <a:p>
-            <a:pPr algn="ctr"/>
-            <a:r>
-              <a:rPr lang="en-US" sz="5400" b="1" i="1" dirty="0">
-                <a:solidFill>
-                  <a:srgbClr val="FFFFFF"/>
-                </a:solidFill>
-              </a:rPr>
-              <a:t>L</a:t>
-            </a:r>
-            <a:r>
-              <a:rPr lang="en-US" sz="5400" b="1" i="1" dirty="0" smtClean="0">
-                <a:solidFill>
-                  <a:srgbClr val="FFFFFF"/>
-                </a:solidFill>
-              </a:rPr>
-              <a:t>ightcurve Source</a:t>
-            </a:r>
-          </a:p>
-          <a:p>
-            <a:r>
-              <a:rPr lang="en-US" sz="3200" b="1" i="1" dirty="0" smtClean="0">
-                <a:solidFill>
-                  <a:schemeClr val="bg1"/>
-                </a:solidFill>
-              </a:rPr>
-              <a:t>The </a:t>
-            </a:r>
-            <a:r>
-              <a:rPr lang="en-US" sz="3200" b="1" i="1" dirty="0" smtClean="0">
-                <a:solidFill>
-                  <a:schemeClr val="bg1"/>
-                </a:solidFill>
-              </a:rPr>
-              <a:t>library used to extract the lightcurves on this poster is available on both GitHub and the Python Package Index.  You can find more information, download the source, or contribute to the library at the following:</a:t>
-            </a:r>
-          </a:p>
-        </p:txBody>
-      </p:sp>
-      <p:sp>
-        <p:nvSpPr>
-          <p:cNvPr id="117" name="TextBox 116"/>
-          <p:cNvSpPr txBox="1"/>
-          <p:nvPr/>
-        </p:nvSpPr>
-        <p:spPr>
-          <a:xfrm>
-            <a:off x="616430" y="38184115"/>
-            <a:ext cx="6792380" cy="584776"/>
-          </a:xfrm>
-          <a:prstGeom prst="rect">
-            <a:avLst/>
-          </a:prstGeom>
-          <a:noFill/>
-        </p:spPr>
-        <p:txBody>
-          <a:bodyPr wrap="square" rtlCol="0">
-            <a:spAutoFit/>
-          </a:bodyPr>
-          <a:lstStyle/>
-          <a:p>
-            <a:pPr algn="ctr"/>
-            <a:r>
-              <a:rPr lang="en-US" sz="3200" b="1" i="1" dirty="0" smtClean="0">
-                <a:solidFill>
-                  <a:srgbClr val="FFFFFF"/>
-                </a:solidFill>
-                <a:hlinkClick r:id="rId11"/>
-              </a:rPr>
-              <a:t>http://justincely.github.io/lightcurve/</a:t>
-            </a:r>
-            <a:endParaRPr lang="en-US" sz="3200" b="1" i="1" dirty="0" smtClean="0">
-              <a:solidFill>
-                <a:srgbClr val="FFFFFF"/>
-              </a:solidFill>
-            </a:endParaRPr>
-          </a:p>
-        </p:txBody>
-      </p:sp>
-      <p:sp>
-        <p:nvSpPr>
-          <p:cNvPr id="118" name="TextBox 117"/>
-          <p:cNvSpPr txBox="1"/>
-          <p:nvPr/>
-        </p:nvSpPr>
-        <p:spPr>
-          <a:xfrm>
-            <a:off x="20589443" y="10175128"/>
-            <a:ext cx="8949985" cy="9787297"/>
-          </a:xfrm>
-          <a:prstGeom prst="rect">
-            <a:avLst/>
-          </a:prstGeom>
-          <a:noFill/>
-        </p:spPr>
-        <p:txBody>
-          <a:bodyPr wrap="square" rtlCol="0">
-            <a:spAutoFit/>
-          </a:bodyPr>
-          <a:lstStyle/>
-          <a:p>
-            <a:pPr algn="ctr"/>
-            <a:r>
-              <a:rPr lang="en-US" sz="5400" b="1" i="1" dirty="0" err="1" smtClean="0">
-                <a:solidFill>
-                  <a:srgbClr val="FFFFFF"/>
-                </a:solidFill>
-              </a:rPr>
-              <a:t>Splittag</a:t>
-            </a:r>
-            <a:endParaRPr lang="en-US" sz="5400" b="1" i="1" dirty="0" smtClean="0">
-              <a:solidFill>
-                <a:srgbClr val="FFFFFF"/>
-              </a:solidFill>
-            </a:endParaRPr>
-          </a:p>
-          <a:p>
-            <a:pPr algn="just"/>
-            <a:r>
-              <a:rPr lang="en-US" sz="3200" b="1" i="1" dirty="0" smtClean="0">
-                <a:solidFill>
-                  <a:schemeClr val="bg1"/>
-                </a:solidFill>
-              </a:rPr>
-              <a:t>Another way to sample variability in a target is to split up an observation in time and re-extract a dispersed spectrum from each.  This means that, data quality permitting, each individual COS exposure can become a sample of spectra separated in time.</a:t>
-            </a:r>
-          </a:p>
-          <a:p>
-            <a:pPr algn="just"/>
-            <a:endParaRPr lang="en-US" sz="3200" b="1" i="1" dirty="0">
-              <a:solidFill>
-                <a:schemeClr val="bg1"/>
-              </a:solidFill>
-            </a:endParaRPr>
-          </a:p>
-          <a:p>
-            <a:pPr algn="just"/>
-            <a:r>
-              <a:rPr lang="en-US" sz="3200" b="1" i="1" dirty="0" smtClean="0">
-                <a:solidFill>
-                  <a:schemeClr val="bg1"/>
-                </a:solidFill>
-              </a:rPr>
-              <a:t>Splittag can be used to separate data by specifying either: </a:t>
-            </a:r>
-          </a:p>
-          <a:p>
-            <a:pPr marL="514350" indent="-514350" algn="ctr">
-              <a:buFont typeface="Arial"/>
-              <a:buChar char="•"/>
-            </a:pPr>
-            <a:r>
-              <a:rPr lang="en-US" sz="3200" b="1" i="1" dirty="0" smtClean="0">
-                <a:solidFill>
-                  <a:schemeClr val="bg1"/>
-                </a:solidFill>
-              </a:rPr>
-              <a:t>Start, stop and increment times</a:t>
-            </a:r>
-          </a:p>
-          <a:p>
-            <a:pPr algn="ctr"/>
-            <a:r>
-              <a:rPr lang="en-US" sz="3200" b="1" i="1" dirty="0" smtClean="0">
-                <a:solidFill>
-                  <a:schemeClr val="bg1"/>
-                </a:solidFill>
-              </a:rPr>
-              <a:t> or </a:t>
-            </a:r>
-          </a:p>
-          <a:p>
-            <a:pPr marL="514350" indent="-514350" algn="ctr">
-              <a:buFont typeface="Arial"/>
-              <a:buChar char="•"/>
-            </a:pPr>
-            <a:r>
-              <a:rPr lang="en-US" sz="3200" b="1" i="1" dirty="0" smtClean="0">
-                <a:solidFill>
-                  <a:schemeClr val="bg1"/>
-                </a:solidFill>
-              </a:rPr>
-              <a:t>An explicit list of time intervals.</a:t>
-            </a:r>
-          </a:p>
-          <a:p>
-            <a:pPr marL="514350" indent="-514350" algn="ctr">
-              <a:buFont typeface="Arial"/>
-              <a:buChar char="•"/>
-            </a:pPr>
-            <a:endParaRPr lang="en-US" sz="3200" b="1" i="1" dirty="0">
-              <a:solidFill>
-                <a:schemeClr val="bg1"/>
-              </a:solidFill>
-            </a:endParaRPr>
-          </a:p>
-          <a:p>
-            <a:pPr algn="just"/>
-            <a:r>
-              <a:rPr lang="en-US" sz="3200" b="1" i="1" dirty="0" smtClean="0">
-                <a:solidFill>
-                  <a:schemeClr val="bg1"/>
-                </a:solidFill>
-              </a:rPr>
-              <a:t>The task will break apart the input corrtag file, copying the events from the specified times to new output files.  After that, simply re-running CalCOS on the newly created corrtag files will re-extracted the spectrum from each.</a:t>
-            </a:r>
-          </a:p>
-        </p:txBody>
-      </p:sp>
-      <p:pic>
-        <p:nvPicPr>
-          <p:cNvPr id="21" name="Picture 20" descr="eclipse_split.pdf"/>
-          <p:cNvPicPr>
-            <a:picLocks noChangeAspect="1"/>
-          </p:cNvPicPr>
-          <p:nvPr/>
-        </p:nvPicPr>
-        <p:blipFill>
-          <a:blip r:embed="rId12">
-            <a:extLst>
-              <a:ext uri="{28A0092B-C50C-407E-A947-70E740481C1C}">
-                <a14:useLocalDpi xmlns:a14="http://schemas.microsoft.com/office/drawing/2010/main" val="0"/>
-              </a:ext>
-            </a:extLst>
-          </a:blip>
-          <a:stretch>
-            <a:fillRect/>
-          </a:stretch>
-        </p:blipFill>
-        <p:spPr>
-          <a:xfrm>
-            <a:off x="20589443" y="21272463"/>
+            <a:off x="20602143" y="21272463"/>
             <a:ext cx="8686800" cy="6126175"/>
           </a:xfrm>
           <a:prstGeom prst="rect">
@@ -4937,7 +5014,7 @@
         <p:spPr>
           <a:xfrm>
             <a:off x="30666267" y="10175128"/>
-            <a:ext cx="8578945" cy="9787297"/>
+            <a:ext cx="8578945" cy="11264624"/>
           </a:xfrm>
           <a:prstGeom prst="rect">
             <a:avLst/>
@@ -4957,7 +5034,7 @@
                   <a:srgbClr val="FFFFFF"/>
                 </a:solidFill>
               </a:rPr>
-              <a:t>Pulse Height Filtering</a:t>
+              <a:t>Dark-Count Screening</a:t>
             </a:r>
           </a:p>
           <a:p>
@@ -4987,7 +5064,7 @@
                   <a:schemeClr val="bg1"/>
                 </a:solidFill>
               </a:rPr>
-              <a:t>To reduce the observed background, events are screened on PHA during CalCOS processing.  The standard pulse height parameters table (PHATAB) specifies a lower bound of 2 and an upper bound of 23 for good data.  Everything outdside of these bounds is excluded.</a:t>
+              <a:t>To reduce the observed background, events are screened on PHA during CalCOS processing.  The standard pulse height parameters table (PHATAB) specifies a lower bound of 2 and an upper bound of 23 for good data across the whole detector.  Everything outside of these boundaries is excluded.</a:t>
             </a:r>
           </a:p>
           <a:p>
@@ -5006,7 +5083,7 @@
                   <a:schemeClr val="bg1"/>
                 </a:solidFill>
               </a:rPr>
-              <a:t>While these values are applicible for the entiretly of the COS archive to date, individual datasets could instead use tighter boundaries to further remove background contamination in spectra.</a:t>
+              <a:t>While these values are applicible for the entirety of the COS archive to date, individual datasets could instead use tighter boundaries to further remove background contamination in spectra.  By simple modifications to the standard reference files, additional filtering can be imposed. </a:t>
             </a:r>
             <a:endParaRPr lang="en-US" sz="3200" b="1" i="1" dirty="0" smtClean="0">
               <a:solidFill>
@@ -5141,23 +5218,39 @@
                   <a:schemeClr val="bg1"/>
                 </a:solidFill>
               </a:rPr>
-              <a:t>_* file.  This file contains a list of every event detected during an observation, along with a large amount of associated formation used in later processing: incident time, detector position, data quality, wavelength, and pulse-height </a:t>
-            </a:r>
-            <a:r>
-              <a:rPr lang="en-US" sz="3200" b="1" i="1" dirty="0" err="1" smtClean="0">
-                <a:solidFill>
-                  <a:schemeClr val="bg1"/>
-                </a:solidFill>
-              </a:rPr>
-              <a:t>amplitutde</a:t>
-            </a:r>
-            <a:r>
-              <a:rPr lang="en-US" sz="3200" b="1" i="1" dirty="0" smtClean="0">
-                <a:solidFill>
-                  <a:schemeClr val="bg1"/>
-                </a:solidFill>
-              </a:rPr>
-              <a:t> (PHA) to name just a few.  Other extensions in the file also include tables of times with good data quality and a second-by-second accounting of various orbital parameters.</a:t>
+              <a:t>_* file.  This file contains a list of every event detected during an observation, along with a large amount of associated </a:t>
+            </a:r>
+            <a:r>
+              <a:rPr lang="en-US" sz="3200" b="1" i="1" dirty="0" smtClean="0">
+                <a:solidFill>
+                  <a:schemeClr val="bg1"/>
+                </a:solidFill>
+              </a:rPr>
+              <a:t>information </a:t>
+            </a:r>
+            <a:r>
+              <a:rPr lang="en-US" sz="3200" b="1" i="1" dirty="0" smtClean="0">
+                <a:solidFill>
+                  <a:schemeClr val="bg1"/>
+                </a:solidFill>
+              </a:rPr>
+              <a:t>used in later processing: incident time, detector position, data quality, wavelength, and pulse-height </a:t>
+            </a:r>
+            <a:r>
+              <a:rPr lang="en-US" sz="3200" b="1" i="1" dirty="0" smtClean="0">
+                <a:solidFill>
+                  <a:schemeClr val="bg1"/>
+                </a:solidFill>
+              </a:rPr>
+              <a:t>amplitude </a:t>
+            </a:r>
+            <a:r>
+              <a:rPr lang="en-US" sz="3200" b="1" i="1" dirty="0" smtClean="0">
+                <a:solidFill>
+                  <a:schemeClr val="bg1"/>
+                </a:solidFill>
+              </a:rPr>
+              <a:t>(PHA) to name just a few.  Other extensions in the file also include tables of times with good data quality and a second-by-second accounting of various orbital parameters.</a:t>
             </a:r>
           </a:p>
           <a:p>
@@ -5221,20 +5314,41 @@
             <a:r>
               <a:rPr lang="en-US" sz="3200" b="1" i="1" dirty="0" smtClean="0">
                 <a:solidFill>
-                  <a:schemeClr val="bg1"/>
-                </a:solidFill>
-                <a:hlinkClick r:id="rId13"/>
+                  <a:srgbClr val="FF0000"/>
+                </a:solidFill>
+                <a:hlinkClick r:id="rId9"/>
               </a:rPr>
               <a:t>COS Data Products</a:t>
             </a:r>
             <a:r>
               <a:rPr lang="en-US" sz="3200" b="1" i="1" dirty="0" smtClean="0">
                 <a:solidFill>
-                  <a:schemeClr val="bg1"/>
-                </a:solidFill>
-              </a:rPr>
-              <a:t> section of the current Data Handbook.</a:t>
-            </a:r>
+                  <a:srgbClr val="FF0000"/>
+                </a:solidFill>
+              </a:rPr>
+              <a:t> </a:t>
+            </a:r>
+            <a:r>
+              <a:rPr lang="en-US" sz="3200" b="1" i="1" dirty="0" smtClean="0">
+                <a:solidFill>
+                  <a:schemeClr val="bg1"/>
+                </a:solidFill>
+              </a:rPr>
+              <a:t>section of the current Data </a:t>
+            </a:r>
+            <a:r>
+              <a:rPr lang="en-US" sz="3200" b="1" i="1" dirty="0" smtClean="0">
+                <a:solidFill>
+                  <a:schemeClr val="bg1"/>
+                </a:solidFill>
+              </a:rPr>
+              <a:t>Handbook.</a:t>
+            </a:r>
+            <a:endParaRPr lang="en-US" sz="3200" b="1" i="1" dirty="0" smtClean="0">
+              <a:solidFill>
+                <a:schemeClr val="bg1"/>
+              </a:solidFill>
+            </a:endParaRPr>
           </a:p>
         </p:txBody>
       </p:sp>
@@ -5283,15 +5397,7 @@
                   <a:schemeClr val="bg1"/>
                 </a:solidFill>
               </a:rPr>
-              <a:t>The top panel shows the standard </a:t>
-            </a:r>
-            <a:r>
-              <a:rPr lang="en-US" sz="2800" b="1" i="1" dirty="0" err="1" smtClean="0">
-                <a:solidFill>
-                  <a:schemeClr val="bg1"/>
-                </a:solidFill>
-              </a:rPr>
-              <a:t>CalCOS</a:t>
+              <a:t>The top panel shows the standard CalCOS x1d spectrum, and the bottom panel displays the summed counts in each second of the </a:t>
             </a:r>
             <a:r>
               <a:rPr lang="en-US" sz="2800" b="1" i="1" dirty="0" smtClean="0">
@@ -5299,7 +5405,31 @@
                   <a:schemeClr val="bg1"/>
                 </a:solidFill>
               </a:rPr>
-              <a:t> x1d spectrum, and the bottom panel displays the summed counts in each second of the exposure.  Clearly evident in the lightcurve is variability on ~sub 100 second timescalse, along with an evident transit.  </a:t>
+              <a:t>exposure extracted by custom software.  </a:t>
+            </a:r>
+            <a:r>
+              <a:rPr lang="en-US" sz="2800" b="1" i="1" dirty="0" smtClean="0">
+                <a:solidFill>
+                  <a:schemeClr val="bg1"/>
+                </a:solidFill>
+              </a:rPr>
+              <a:t>Clearly evident in the lightcurve is variability on ~sub 100 second </a:t>
+            </a:r>
+            <a:r>
+              <a:rPr lang="en-US" sz="2800" b="1" i="1" dirty="0" smtClean="0">
+                <a:solidFill>
+                  <a:schemeClr val="bg1"/>
+                </a:solidFill>
+              </a:rPr>
+              <a:t>timescales, </a:t>
+            </a:r>
+            <a:r>
+              <a:rPr lang="en-US" sz="2800" b="1" i="1" dirty="0" smtClean="0">
+                <a:solidFill>
+                  <a:schemeClr val="bg1"/>
+                </a:solidFill>
+              </a:rPr>
+              <a:t>along with an evident transit.  </a:t>
             </a:r>
             <a:endParaRPr lang="en-US" sz="2800" b="1" i="1" dirty="0" smtClean="0">
               <a:solidFill>
@@ -5365,21 +5495,34 @@
               <a:t>.  The variable emission features seen between 1300 and 1310 Angstroms are due to Oxygen I in the atmosphere at HST’s orbit.  Their </a:t>
             </a:r>
             <a:r>
-              <a:rPr lang="en-US" sz="2800" b="1" i="1" dirty="0" err="1" smtClean="0">
-                <a:solidFill>
-                  <a:srgbClr val="FFFFFF"/>
-                </a:solidFill>
-              </a:rPr>
-              <a:t>presense</a:t>
-            </a:r>
-            <a:r>
               <a:rPr lang="en-US" sz="2800" b="1" i="1" dirty="0" smtClean="0">
                 <a:solidFill>
                   <a:srgbClr val="FFFFFF"/>
                 </a:solidFill>
               </a:rPr>
-              <a:t> in the spectrum can be hiding the presence of intrinsic features in the spectrum.</a:t>
-            </a:r>
+              <a:t>presence </a:t>
+            </a:r>
+            <a:r>
+              <a:rPr lang="en-US" sz="2800" b="1" i="1" dirty="0" smtClean="0">
+                <a:solidFill>
+                  <a:srgbClr val="FFFFFF"/>
+                </a:solidFill>
+              </a:rPr>
+              <a:t>in the spectrum can </a:t>
+            </a:r>
+            <a:r>
+              <a:rPr lang="en-US" sz="2800" b="1" i="1" dirty="0" smtClean="0">
+                <a:solidFill>
+                  <a:srgbClr val="FFFFFF"/>
+                </a:solidFill>
+              </a:rPr>
+              <a:t>hide the presence of spectral features intrinsic to the source.</a:t>
+            </a:r>
+            <a:endParaRPr lang="en-US" sz="2800" b="1" i="1" dirty="0" smtClean="0">
+              <a:solidFill>
+                <a:srgbClr val="FFFFFF"/>
+              </a:solidFill>
+            </a:endParaRPr>
           </a:p>
         </p:txBody>
       </p:sp>
@@ -5457,8 +5600,8 @@
         </p:nvSpPr>
         <p:spPr>
           <a:xfrm>
-            <a:off x="20589443" y="27827802"/>
-            <a:ext cx="8949985" cy="3970318"/>
+            <a:off x="20589443" y="27652104"/>
+            <a:ext cx="8949985" cy="4401205"/>
           </a:xfrm>
           <a:prstGeom prst="rect">
             <a:avLst/>
@@ -5486,7 +5629,7 @@
                   <a:srgbClr val="FFFFFF"/>
                 </a:solidFill>
               </a:rPr>
-              <a:t>4 shows spectra of IY-UMa; the archival spectrum (top panel), and the split and re-extracted spectra from 3 different time segments (bottom panel) of the same data.  The dataset used here is the same as in Figure 1, and the datasets have been split up into segments of before (0-400 seconds), during (400-900 seconds), and after (900-1300 seconds) the observed transit and re-extracted with CalCOS.  Large differences in the flux leves of the time periods can be seen.  Data has been binned by 15 pixels.</a:t>
+              <a:t>4 shows spectra of IY-UMa; the archival spectrum (top panel), and the split and re-extracted spectra from 3 different time segments (bottom panel) of the same data.  The dataset used here is the same as in Figure 1, and the datasets have been split up into segments of before (0-400 seconds), during (400-900 seconds), and after (900-1300 seconds) the observed transit and re-extracted with CalCOS.  Large differences in the flux levels of the different time periods can be seen.  The data have been binned by 15 pixels.</a:t>
             </a:r>
             <a:endParaRPr lang="en-US" sz="2800" b="1" i="1" dirty="0" smtClean="0">
               <a:solidFill>
@@ -5499,6 +5642,191 @@
       <p:pic>
         <p:nvPicPr>
           <p:cNvPr id="2" name="Picture 1" descr="filtering_by_segment.pdf"/>
+          <p:cNvPicPr>
+            <a:picLocks noChangeAspect="1"/>
+          </p:cNvPicPr>
+          <p:nvPr/>
+        </p:nvPicPr>
+        <p:blipFill>
+          <a:blip r:embed="rId10">
+            <a:extLst>
+              <a:ext uri="{28A0092B-C50C-407E-A947-70E740481C1C}">
+                <a14:useLocalDpi xmlns:a14="http://schemas.microsoft.com/office/drawing/2010/main"/>
+              </a:ext>
+            </a:extLst>
+          </a:blip>
+          <a:stretch>
+            <a:fillRect/>
+          </a:stretch>
+        </p:blipFill>
+        <p:spPr>
+          <a:xfrm>
+            <a:off x="30829250" y="22017021"/>
+            <a:ext cx="8286749" cy="7553113"/>
+          </a:xfrm>
+          <a:prstGeom prst="rect">
+            <a:avLst/>
+          </a:prstGeom>
+        </p:spPr>
+      </p:pic>
+      <p:sp>
+        <p:nvSpPr>
+          <p:cNvPr id="34" name="TextBox 33"/>
+          <p:cNvSpPr txBox="1"/>
+          <p:nvPr/>
+        </p:nvSpPr>
+        <p:spPr>
+          <a:xfrm>
+            <a:off x="30473155" y="29617590"/>
+            <a:ext cx="8949985" cy="3108544"/>
+          </a:xfrm>
+          <a:prstGeom prst="rect">
+            <a:avLst/>
+          </a:prstGeom>
+          <a:noFill/>
+        </p:spPr>
+        <p:txBody>
+          <a:bodyPr wrap="square" rtlCol="0">
+            <a:spAutoFit/>
+          </a:bodyPr>
+          <a:lstStyle/>
+          <a:p>
+            <a:pPr algn="just"/>
+            <a:r>
+              <a:rPr lang="en-US" sz="2800" b="1" i="1" dirty="0" smtClean="0">
+                <a:solidFill>
+                  <a:srgbClr val="FFFFFF"/>
+                </a:solidFill>
+              </a:rPr>
+              <a:t>Figure </a:t>
+            </a:r>
+            <a:r>
+              <a:rPr lang="en-US" sz="2800" b="1" i="1" dirty="0">
+                <a:solidFill>
+                  <a:srgbClr val="FFFFFF"/>
+                </a:solidFill>
+              </a:rPr>
+              <a:t>5</a:t>
+            </a:r>
+            <a:r>
+              <a:rPr lang="en-US" sz="2800" b="1" i="1" dirty="0" smtClean="0">
+                <a:solidFill>
+                  <a:srgbClr val="FFFFFF"/>
+                </a:solidFill>
+              </a:rPr>
+              <a:t> shows the pulse height distributions for FUVA (top) and FUVB (bottom) for a dataset taken in 2010.  Red lines indicate the PHA limits imposed by the current reference file.  Grey regions indicate the approximate additional range of pulse-heights that could be screened out for this particular dataset.  Data has been binned across the entire detector.</a:t>
+            </a:r>
+            <a:endParaRPr lang="en-US" sz="2800" b="1" i="1" dirty="0" smtClean="0">
+              <a:solidFill>
+                <a:srgbClr val="FFFFFF"/>
+              </a:solidFill>
+            </a:endParaRPr>
+          </a:p>
+        </p:txBody>
+      </p:sp>
+      <p:pic>
+        <p:nvPicPr>
+          <p:cNvPr id="3" name="Picture 2" descr="poster_webpage.png"/>
+          <p:cNvPicPr>
+            <a:picLocks noChangeAspect="1"/>
+          </p:cNvPicPr>
+          <p:nvPr/>
+        </p:nvPicPr>
+        <p:blipFill>
+          <a:blip r:embed="rId11">
+            <a:extLst>
+              <a:ext uri="{28A0092B-C50C-407E-A947-70E740481C1C}">
+                <a14:useLocalDpi xmlns:a14="http://schemas.microsoft.com/office/drawing/2010/main"/>
+              </a:ext>
+            </a:extLst>
+          </a:blip>
+          <a:stretch>
+            <a:fillRect/>
+          </a:stretch>
+        </p:blipFill>
+        <p:spPr>
+          <a:xfrm>
+            <a:off x="35435212" y="34958891"/>
+            <a:ext cx="3810000" cy="3810000"/>
+          </a:xfrm>
+          <a:prstGeom prst="rect">
+            <a:avLst/>
+          </a:prstGeom>
+        </p:spPr>
+      </p:pic>
+      <p:pic>
+        <p:nvPicPr>
+          <p:cNvPr id="8" name="Picture 7" descr="spectrum_vs_lightcurve.pdf"/>
+          <p:cNvPicPr>
+            <a:picLocks noChangeAspect="1"/>
+          </p:cNvPicPr>
+          <p:nvPr/>
+        </p:nvPicPr>
+        <p:blipFill>
+          <a:blip r:embed="rId12">
+            <a:extLst>
+              <a:ext uri="{28A0092B-C50C-407E-A947-70E740481C1C}">
+                <a14:useLocalDpi xmlns:a14="http://schemas.microsoft.com/office/drawing/2010/main" val="0"/>
+              </a:ext>
+            </a:extLst>
+          </a:blip>
+          <a:stretch>
+            <a:fillRect/>
+          </a:stretch>
+        </p:blipFill>
+        <p:spPr>
+          <a:xfrm>
+            <a:off x="748185" y="26495544"/>
+            <a:ext cx="8686800" cy="4575997"/>
+          </a:xfrm>
+          <a:prstGeom prst="rect">
+            <a:avLst/>
+          </a:prstGeom>
+        </p:spPr>
+      </p:pic>
+      <p:pic>
+        <p:nvPicPr>
+          <p:cNvPr id="9" name="Picture 8" descr="spectrum_before.pdf"/>
+          <p:cNvPicPr>
+            <a:picLocks noChangeAspect="1"/>
+          </p:cNvPicPr>
+          <p:nvPr/>
+        </p:nvPicPr>
+        <p:blipFill>
+          <a:blip r:embed="rId13">
+            <a:extLst>
+              <a:ext uri="{28A0092B-C50C-407E-A947-70E740481C1C}">
+                <a14:useLocalDpi xmlns:a14="http://schemas.microsoft.com/office/drawing/2010/main" val="0"/>
+              </a:ext>
+            </a:extLst>
+          </a:blip>
+          <a:stretch>
+            <a:fillRect/>
+          </a:stretch>
+        </p:blipFill>
+        <p:spPr>
+          <a:xfrm>
+            <a:off x="10669970" y="23723600"/>
+            <a:ext cx="8686800" cy="4410870"/>
+          </a:xfrm>
+          <a:prstGeom prst="rect">
+            <a:avLst/>
+          </a:prstGeom>
+          <a:ln>
+            <a:noFill/>
+          </a:ln>
+          <a:effectLst>
+            <a:outerShdw blurRad="292100" dist="139700" dir="2700000" algn="tl" rotWithShape="0">
+              <a:srgbClr val="333333">
+                <a:alpha val="65000"/>
+              </a:srgbClr>
+            </a:outerShdw>
+          </a:effectLst>
+        </p:spPr>
+      </p:pic>
+      <p:pic>
+        <p:nvPicPr>
+          <p:cNvPr id="10" name="Picture 9" descr="spectrum_after.pdf"/>
           <p:cNvPicPr>
             <a:picLocks noChangeAspect="1"/>
           </p:cNvPicPr>
@@ -5518,69 +5846,14 @@
         </p:blipFill>
         <p:spPr>
           <a:xfrm>
-            <a:off x="30829250" y="20274689"/>
-            <a:ext cx="8286749" cy="7553113"/>
+            <a:off x="10669970" y="31430587"/>
+            <a:ext cx="8686800" cy="4410870"/>
           </a:xfrm>
           <a:prstGeom prst="rect">
             <a:avLst/>
           </a:prstGeom>
         </p:spPr>
       </p:pic>
-      <p:sp>
-        <p:nvSpPr>
-          <p:cNvPr id="34" name="TextBox 33"/>
-          <p:cNvSpPr txBox="1"/>
-          <p:nvPr/>
-        </p:nvSpPr>
-        <p:spPr>
-          <a:xfrm>
-            <a:off x="30473155" y="27926722"/>
-            <a:ext cx="8949985" cy="3108544"/>
-          </a:xfrm>
-          <a:prstGeom prst="rect">
-            <a:avLst/>
-          </a:prstGeom>
-          <a:noFill/>
-        </p:spPr>
-        <p:txBody>
-          <a:bodyPr wrap="square" rtlCol="0">
-            <a:spAutoFit/>
-          </a:bodyPr>
-          <a:lstStyle/>
-          <a:p>
-            <a:pPr algn="just"/>
-            <a:r>
-              <a:rPr lang="en-US" sz="2800" b="1" i="1" dirty="0" smtClean="0">
-                <a:solidFill>
-                  <a:srgbClr val="FFFFFF"/>
-                </a:solidFill>
-              </a:rPr>
-              <a:t>Figure </a:t>
-            </a:r>
-            <a:r>
-              <a:rPr lang="en-US" sz="2800" b="1" i="1" dirty="0">
-                <a:solidFill>
-                  <a:srgbClr val="FFFFFF"/>
-                </a:solidFill>
-              </a:rPr>
-              <a:t>5</a:t>
-            </a:r>
-            <a:r>
-              <a:rPr lang="en-US" sz="2800" b="1" i="1" dirty="0" smtClean="0">
-                <a:solidFill>
-                  <a:srgbClr val="FFFFFF"/>
-                </a:solidFill>
-              </a:rPr>
-              <a:t> shows the pulse height distributions for FUVA (top) and FUVB (bottom) for a dataset taken in 2010.  Red lines indicate the PHA limits imposed by the current reference file.  Grey regions indicate the approximate additional range of pulse-heights that could be screened out for this particular dataset.  Data has been binned across the entire detector.</a:t>
-            </a:r>
-            <a:endParaRPr lang="en-US" sz="2800" b="1" i="1" dirty="0" smtClean="0">
-              <a:solidFill>
-                <a:srgbClr val="FFFFFF"/>
-              </a:solidFill>
-            </a:endParaRPr>
-          </a:p>
-        </p:txBody>
-      </p:sp>
     </p:spTree>
     <p:extLst>
       <p:ext uri="{BB962C8B-B14F-4D97-AF65-F5344CB8AC3E}">
@@ -5604,7 +5877,7 @@
 <file path=ppt/theme/theme1.xml><?xml version="1.0" encoding="utf-8"?>
 <a:theme xmlns:a="http://schemas.openxmlformats.org/drawingml/2006/main" name="Office Theme">
   <a:themeElements>
-    <a:clrScheme name="Office">
+    <a:clrScheme name="Custom 1">
       <a:dk1>
         <a:sysClr val="windowText" lastClr="000000"/>
       </a:dk1>
@@ -5636,7 +5909,7 @@
         <a:srgbClr val="F79646"/>
       </a:accent6>
       <a:hlink>
-        <a:srgbClr val="0000FF"/>
+        <a:srgbClr val="FF4E08"/>
       </a:hlink>
       <a:folHlink>
         <a:srgbClr val="800080"/>

</xml_diff>

<commit_message>
Printed version after final comments
</commit_message>
<xml_diff>
--- a/AAS_224_ELY.pptx
+++ b/AAS_224_ELY.pptx
@@ -3686,7 +3686,7 @@
                   <a:srgbClr val="FFFFFF"/>
                 </a:solidFill>
               </a:rPr>
-              <a:t>CS</a:t>
+              <a:t>CSC</a:t>
             </a:r>
             <a:endParaRPr lang="en-US" sz="3600" b="1" dirty="0" smtClean="0">
               <a:solidFill>
@@ -4232,7 +4232,7 @@
                   <a:srgbClr val="FFFFFF"/>
                 </a:solidFill>
               </a:rPr>
-              <a:t>Airglow Strength (Ly Alpha, OI)</a:t>
+              <a:t>Airglow Strength (LyA, OI)</a:t>
             </a:r>
           </a:p>
           <a:p>
@@ -4246,7 +4246,7 @@
                   <a:srgbClr val="FFFFFF"/>
                 </a:solidFill>
               </a:rPr>
-              <a:t>Longitude, Latitude</a:t>
+              <a:t>Longitude and Latitude of HST</a:t>
             </a:r>
           </a:p>
           <a:p>
@@ -4587,7 +4587,23 @@
                   <a:schemeClr val="bg1"/>
                 </a:solidFill>
               </a:rPr>
-              <a:t>in time-tag mode, </a:t>
+              <a:t>in </a:t>
+            </a:r>
+            <a:r>
+              <a:rPr lang="en-US" sz="3200" b="1" i="1" dirty="0" smtClean="0">
+                <a:solidFill>
+                  <a:schemeClr val="bg1"/>
+                </a:solidFill>
+              </a:rPr>
+              <a:t>TIME-TAG mode</a:t>
+            </a:r>
+            <a:r>
+              <a:rPr lang="en-US" sz="3200" b="1" i="1" dirty="0" smtClean="0">
+                <a:solidFill>
+                  <a:schemeClr val="bg1"/>
+                </a:solidFill>
+              </a:rPr>
+              <a:t>, </a:t>
             </a:r>
             <a:r>
               <a:rPr lang="en-US" sz="3200" b="1" i="1" dirty="0" smtClean="0">
@@ -4690,7 +4706,7 @@
         <p:spPr>
           <a:xfrm>
             <a:off x="616430" y="34579530"/>
-            <a:ext cx="8927391" cy="2893100"/>
+            <a:ext cx="8927391" cy="2646879"/>
           </a:xfrm>
           <a:prstGeom prst="rect">
             <a:avLst/>
@@ -4724,7 +4740,7 @@
           <a:p>
             <a:pPr algn="just"/>
             <a:r>
-              <a:rPr lang="en-US" sz="3200" b="1" i="1" dirty="0" smtClean="0">
+              <a:rPr lang="en-US" sz="2800" b="1" i="1" dirty="0" smtClean="0">
                 <a:solidFill>
                   <a:schemeClr val="bg1"/>
                 </a:solidFill>
@@ -4732,7 +4748,7 @@
               <a:t>The </a:t>
             </a:r>
             <a:r>
-              <a:rPr lang="en-US" sz="3200" b="1" i="1" dirty="0" smtClean="0">
+              <a:rPr lang="en-US" sz="2800" b="1" i="1" dirty="0" smtClean="0">
                 <a:solidFill>
                   <a:schemeClr val="bg1"/>
                 </a:solidFill>
@@ -4740,14 +4756,46 @@
               <a:t>library used to extract the lightcurves on this poster </a:t>
             </a:r>
             <a:r>
-              <a:rPr lang="en-US" sz="3200" b="1" i="1" dirty="0" smtClean="0">
-                <a:solidFill>
-                  <a:schemeClr val="bg1"/>
-                </a:solidFill>
-              </a:rPr>
-              <a:t>is an open-source package maintained by Justin Ely.  The COS Team at STScI makes no claims to it’s scientific validity.</a:t>
-            </a:r>
-            <a:endParaRPr lang="en-US" sz="3200" b="1" i="1" dirty="0" smtClean="0">
+              <a:rPr lang="en-US" sz="2800" b="1" i="1" dirty="0" smtClean="0">
+                <a:solidFill>
+                  <a:schemeClr val="bg1"/>
+                </a:solidFill>
+              </a:rPr>
+              <a:t>is an open-source package maintained by Justin Ely. </a:t>
+            </a:r>
+            <a:r>
+              <a:rPr lang="en-US" sz="2800" b="1" i="1" dirty="0">
+                <a:solidFill>
+                  <a:schemeClr val="bg1"/>
+                </a:solidFill>
+              </a:rPr>
+              <a:t>This code is under development and has not been extensively tested and so </a:t>
+            </a:r>
+            <a:r>
+              <a:rPr lang="en-US" sz="2800" b="1" i="1" dirty="0" smtClean="0">
+                <a:solidFill>
+                  <a:schemeClr val="bg1"/>
+                </a:solidFill>
+              </a:rPr>
+              <a:t>its </a:t>
+            </a:r>
+            <a:r>
+              <a:rPr lang="en-US" sz="2800" b="1" i="1" dirty="0">
+                <a:solidFill>
+                  <a:schemeClr val="bg1"/>
+                </a:solidFill>
+              </a:rPr>
+              <a:t>scientific validity cannot be </a:t>
+            </a:r>
+            <a:r>
+              <a:rPr lang="en-US" sz="2800" b="1" i="1" dirty="0" smtClean="0">
+                <a:solidFill>
+                  <a:schemeClr val="bg1"/>
+                </a:solidFill>
+              </a:rPr>
+              <a:t>guaranteed.</a:t>
+            </a:r>
+            <a:endParaRPr lang="en-US" sz="2800" b="1" i="1" dirty="0" smtClean="0">
               <a:solidFill>
                 <a:schemeClr val="bg1"/>
               </a:solidFill>
@@ -4830,7 +4878,7 @@
         <p:spPr>
           <a:xfrm>
             <a:off x="20589443" y="10175128"/>
-            <a:ext cx="8949985" cy="10279739"/>
+            <a:ext cx="8949985" cy="9787297"/>
           </a:xfrm>
           <a:prstGeom prst="rect">
             <a:avLst/>
@@ -4885,7 +4933,7 @@
                   <a:schemeClr val="bg1"/>
                 </a:solidFill>
               </a:rPr>
-              <a:t>The Splittag modugle, </a:t>
+              <a:t>The Splittag module, </a:t>
             </a:r>
             <a:r>
               <a:rPr lang="en-US" sz="3200" b="1" i="1" dirty="0">
@@ -4952,10 +5000,7 @@
             </a:r>
           </a:p>
           <a:p>
-            <a:pPr marL="514350" indent="-514350" algn="ctr">
-              <a:buFont typeface="Arial"/>
-              <a:buChar char="•"/>
-            </a:pPr>
+            <a:pPr algn="just"/>
             <a:endParaRPr lang="en-US" sz="3200" b="1" i="1" dirty="0">
               <a:solidFill>
                 <a:schemeClr val="bg1"/>
@@ -4965,13 +5010,18 @@
           <a:p>
             <a:pPr algn="just"/>
             <a:r>
-              <a:rPr lang="en-US" sz="3200" b="1" i="1" dirty="0" smtClean="0">
-                <a:solidFill>
-                  <a:schemeClr val="bg1"/>
-                </a:solidFill>
-              </a:rPr>
-              <a:t>The task will break apart the input corrtag file, copying the events from the specified times to new output files.  After that, simply re-running CalCOS on the newly created corrtag files will re-extract a spectrum from each.</a:t>
-            </a:r>
+              <a:rPr lang="en-US" sz="3200" b="1" i="1" dirty="0">
+                <a:solidFill>
+                  <a:srgbClr val="FFFFFF"/>
+                </a:solidFill>
+              </a:rPr>
+              <a:t>The task will break apart the input corrtag file, copying the events from the specified times to new output files that can then be re-reduced with CalCOS to produce a spectrum for each time period.</a:t>
+            </a:r>
+            <a:endParaRPr lang="en-US" sz="3200" b="1" i="1" dirty="0" smtClean="0">
+              <a:solidFill>
+                <a:srgbClr val="FFFFFF"/>
+              </a:solidFill>
+            </a:endParaRPr>
           </a:p>
         </p:txBody>
       </p:sp>
@@ -5045,7 +5095,7 @@
                   <a:schemeClr val="bg1"/>
                 </a:solidFill>
               </a:rPr>
-              <a:t>The typical Pulse Height Amplitude (PHA) of detected photons continues to evolve as the detectors continue to be used.  Regions of the detector that experience heavy count rates, particularly those that see the LyA airglow emission, evolve faster than others.  </a:t>
+              <a:t>The typical Pulse Height Amplitude (PHA) of detected photons continues to evolve as the detectors are used.  Regions of the detector that experience heavy count rates, particularly those that see the LyA airglow emission, evolve faster than others.  </a:t>
             </a:r>
           </a:p>
           <a:p>
@@ -5285,7 +5335,7 @@
                   <a:schemeClr val="bg1"/>
                 </a:solidFill>
               </a:rPr>
-              <a:t> or other specialized software.  For more information, </a:t>
+              <a:t> or other specialized software.  For more </a:t>
             </a:r>
             <a:r>
               <a:rPr lang="en-US" sz="3200" b="1" i="1" dirty="0" smtClean="0">
@@ -5293,56 +5343,24 @@
                   <a:schemeClr val="bg1"/>
                 </a:solidFill>
               </a:rPr>
-              <a:t>you can</a:t>
+              <a:t>information, visit the data products section of the COS Data Handbook: </a:t>
             </a:r>
             <a:r>
               <a:rPr lang="en-US" sz="3200" b="1" i="1" dirty="0" smtClean="0">
                 <a:solidFill>
-                  <a:schemeClr val="bg1"/>
+                  <a:srgbClr val="FF0000"/>
+                </a:solidFill>
+                <a:hlinkClick r:id="rId9"/>
+              </a:rPr>
+              <a:t>http://www.stsci.edu/hst/cos/documents/handbooks/datahandbook/ch2_cos_data5.html#460902</a:t>
+            </a:r>
+            <a:r>
+              <a:rPr lang="en-US" sz="3200" b="1" i="1" dirty="0" smtClean="0">
+                <a:solidFill>
+                  <a:srgbClr val="FF0000"/>
                 </a:solidFill>
               </a:rPr>
               <a:t> </a:t>
-            </a:r>
-            <a:r>
-              <a:rPr lang="en-US" sz="3200" b="1" i="1" dirty="0" smtClean="0">
-                <a:solidFill>
-                  <a:schemeClr val="bg1"/>
-                </a:solidFill>
-              </a:rPr>
-              <a:t>review the </a:t>
-            </a:r>
-            <a:r>
-              <a:rPr lang="en-US" sz="3200" b="1" i="1" dirty="0" smtClean="0">
-                <a:solidFill>
-                  <a:srgbClr val="FF0000"/>
-                </a:solidFill>
-                <a:hlinkClick r:id="rId9"/>
-              </a:rPr>
-              <a:t>COS Data Products</a:t>
-            </a:r>
-            <a:r>
-              <a:rPr lang="en-US" sz="3200" b="1" i="1" dirty="0" smtClean="0">
-                <a:solidFill>
-                  <a:srgbClr val="FF0000"/>
-                </a:solidFill>
-              </a:rPr>
-              <a:t> </a:t>
-            </a:r>
-            <a:r>
-              <a:rPr lang="en-US" sz="3200" b="1" i="1" dirty="0" smtClean="0">
-                <a:solidFill>
-                  <a:schemeClr val="bg1"/>
-                </a:solidFill>
-              </a:rPr>
-              <a:t>section of the current Data </a:t>
-            </a:r>
-            <a:r>
-              <a:rPr lang="en-US" sz="3200" b="1" i="1" dirty="0" smtClean="0">
-                <a:solidFill>
-                  <a:schemeClr val="bg1"/>
-                </a:solidFill>
-              </a:rPr>
-              <a:t>Handbook.</a:t>
             </a:r>
             <a:endParaRPr lang="en-US" sz="3200" b="1" i="1" dirty="0" smtClean="0">
               <a:solidFill>
@@ -5714,7 +5732,7 @@
                   <a:srgbClr val="FFFFFF"/>
                 </a:solidFill>
               </a:rPr>
-              <a:t> shows the pulse height distributions for FUVA (top) and FUVB (bottom) for a dataset taken in 2010.  Red lines indicate the PHA limits imposed by the current reference file.  Grey regions indicate the approximate additional range of pulse-heights that could be screened out for this particular dataset.  Data has been binned across the entire detector.</a:t>
+              <a:t> shows the pulse height distributions for FUVA (top) and FUVB (bottom) for a dataset taken in 2010.  Red lines indicate the PHA limits imposed by the current reference file.  Grey regions indicate the approximate additional range of pulse-heights that could be screened out for this particular dataset.  Data have been binned across the entire detector.</a:t>
             </a:r>
             <a:endParaRPr lang="en-US" sz="2800" b="1" i="1" dirty="0" smtClean="0">
               <a:solidFill>

</xml_diff>